<commit_message>
update ppt and demos
</commit_message>
<xml_diff>
--- a/materials/slides/ch03.pptx
+++ b/materials/slides/ch03.pptx
@@ -168,7 +168,7 @@
   </p:defaultTextStyle>
   <p:extLst>
     <p:ext uri="{EFAFB233-063F-42B5-8137-9DF3F51BA10A}">
-      <p15:sldGuideLst xmlns:p15="http://schemas.microsoft.com/office/powerpoint/2012/main">
+      <p15:sldGuideLst xmlns:p15="http://schemas.microsoft.com/office/powerpoint/2012/main" xmlns="">
         <p15:guide id="1" orient="horz" pos="1556">
           <p15:clr>
             <a:srgbClr val="A4A3A4"/>
@@ -187,7 +187,7 @@
       </p15:sldGuideLst>
     </p:ext>
     <p:ext uri="{2D200454-40CA-4A62-9FC3-DE9A4176ACB9}">
-      <p15:notesGuideLst xmlns:p15="http://schemas.microsoft.com/office/powerpoint/2012/main">
+      <p15:notesGuideLst xmlns:p15="http://schemas.microsoft.com/office/powerpoint/2012/main" xmlns="">
         <p15:guide id="1" orient="horz" pos="3108">
           <p15:clr>
             <a:srgbClr val="A4A3A4"/>
@@ -505,6 +505,11 @@
         </p:txBody>
       </p:sp>
     </p:spTree>
+    <p:extLst>
+      <p:ext uri="{BB962C8B-B14F-4D97-AF65-F5344CB8AC3E}">
+        <p14:creationId xmlns:p14="http://schemas.microsoft.com/office/powerpoint/2010/main" val="2854967156"/>
+      </p:ext>
+    </p:extLst>
   </p:cSld>
   <p:clrMap bg1="lt1" tx1="dk1" bg2="lt2" tx2="dk2" accent1="accent1" accent2="accent2" accent3="accent3" accent4="accent4" accent5="accent5" accent6="accent6" hlink="hlink" folHlink="folHlink"/>
   <p:notesStyle>
@@ -1084,6 +1089,90 @@
             <p:ph type="sldImg"/>
           </p:nvPr>
         </p:nvSpPr>
+        <p:spPr/>
+      </p:sp>
+      <p:sp>
+        <p:nvSpPr>
+          <p:cNvPr id="3" name="备注占位符 2"/>
+          <p:cNvSpPr>
+            <a:spLocks noGrp="1"/>
+          </p:cNvSpPr>
+          <p:nvPr>
+            <p:ph type="body" idx="1"/>
+          </p:nvPr>
+        </p:nvSpPr>
+        <p:spPr/>
+        <p:txBody>
+          <a:bodyPr/>
+          <a:lstStyle/>
+          <a:p>
+            <a:endParaRPr lang="zh-CN" altLang="en-US" dirty="0"/>
+          </a:p>
+        </p:txBody>
+      </p:sp>
+      <p:sp>
+        <p:nvSpPr>
+          <p:cNvPr id="4" name="灯片编号占位符 3"/>
+          <p:cNvSpPr>
+            <a:spLocks noGrp="1"/>
+          </p:cNvSpPr>
+          <p:nvPr>
+            <p:ph type="sldNum" sz="quarter" idx="10"/>
+          </p:nvPr>
+        </p:nvSpPr>
+        <p:spPr/>
+        <p:txBody>
+          <a:bodyPr/>
+          <a:lstStyle/>
+          <a:p>
+            <a:fld id="{D954A8C1-897D-45F8-BFAB-50E65247FAE3}" type="slidenum">
+              <a:rPr lang="zh-CN" altLang="zh-CN" smtClean="0"/>
+              <a:t>29</a:t>
+            </a:fld>
+            <a:endParaRPr lang="zh-CN" altLang="zh-CN"/>
+          </a:p>
+        </p:txBody>
+      </p:sp>
+    </p:spTree>
+    <p:extLst>
+      <p:ext uri="{BB962C8B-B14F-4D97-AF65-F5344CB8AC3E}">
+        <p14:creationId xmlns:p14="http://schemas.microsoft.com/office/powerpoint/2010/main" val="586716883"/>
+      </p:ext>
+    </p:extLst>
+  </p:cSld>
+  <p:clrMapOvr>
+    <a:masterClrMapping/>
+  </p:clrMapOvr>
+</p:notes>
+</file>
+
+<file path=ppt/notesSlides/notesSlide15.xml><?xml version="1.0" encoding="utf-8"?>
+<p:notes xmlns:a="http://schemas.openxmlformats.org/drawingml/2006/main" xmlns:r="http://schemas.openxmlformats.org/officeDocument/2006/relationships" xmlns:p="http://schemas.openxmlformats.org/presentationml/2006/main">
+  <p:cSld>
+    <p:spTree>
+      <p:nvGrpSpPr>
+        <p:cNvPr id="1" name=""/>
+        <p:cNvGrpSpPr/>
+        <p:nvPr/>
+      </p:nvGrpSpPr>
+      <p:grpSpPr>
+        <a:xfrm>
+          <a:off x="0" y="0"/>
+          <a:ext cx="0" cy="0"/>
+          <a:chOff x="0" y="0"/>
+          <a:chExt cx="0" cy="0"/>
+        </a:xfrm>
+      </p:grpSpPr>
+      <p:sp>
+        <p:nvSpPr>
+          <p:cNvPr id="2" name="幻灯片图像占位符 1"/>
+          <p:cNvSpPr>
+            <a:spLocks noGrp="1" noRot="1" noChangeAspect="1"/>
+          </p:cNvSpPr>
+          <p:nvPr>
+            <p:ph type="sldImg"/>
+          </p:nvPr>
+        </p:nvSpPr>
         <p:spPr>
           <a:xfrm>
             <a:off x="481013" y="1279525"/>
@@ -1212,14 +1301,7 @@
           <a:bodyPr/>
           <a:lstStyle/>
           <a:p>
-            <a:r>
-              <a:rPr kumimoji="0" lang="en-US" altLang="zh-CN" smtClean="0"/>
-              <a:t>JS</a:t>
-            </a:r>
-            <a:r>
-              <a:rPr kumimoji="0" lang="zh-CN" altLang="en-US" smtClean="0"/>
-              <a:t>的作用</a:t>
-            </a:r>
+            <a:endParaRPr kumimoji="0" lang="zh-CN" altLang="en-US" dirty="0" smtClean="0"/>
           </a:p>
         </p:txBody>
       </p:sp>
@@ -1463,14 +1545,7 @@
           <a:bodyPr/>
           <a:lstStyle/>
           <a:p>
-            <a:r>
-              <a:rPr kumimoji="0" lang="en-US" altLang="zh-CN" smtClean="0"/>
-              <a:t>JS</a:t>
-            </a:r>
-            <a:r>
-              <a:rPr kumimoji="0" lang="zh-CN" altLang="en-US" smtClean="0"/>
-              <a:t>的作用</a:t>
-            </a:r>
+            <a:endParaRPr kumimoji="0" lang="zh-CN" altLang="en-US" dirty="0" smtClean="0"/>
           </a:p>
         </p:txBody>
       </p:sp>
@@ -2199,7 +2274,7 @@
         </p:blipFill>
         <p:spPr>
           <a:xfrm>
-            <a:off x="1866901" y="0"/>
+            <a:off x="2181837" y="0"/>
             <a:ext cx="10325100" cy="6883400"/>
           </a:xfrm>
           <a:prstGeom prst="rect">
@@ -2300,7 +2375,7 @@
           <a:p>
             <a:fld id="{1ABFA14F-DE9C-4D83-8C58-D4C03BB9FF78}" type="datetimeFigureOut">
               <a:rPr lang="zh-CN" altLang="en-US" smtClean="0"/>
-              <a:t>2018/9/11</a:t>
+              <a:t>2019/3/3</a:t>
             </a:fld>
             <a:endParaRPr lang="zh-CN" altLang="en-US"/>
           </a:p>
@@ -2628,7 +2703,7 @@
           <a:p>
             <a:fld id="{1ABFA14F-DE9C-4D83-8C58-D4C03BB9FF78}" type="datetimeFigureOut">
               <a:rPr lang="zh-CN" altLang="en-US" smtClean="0"/>
-              <a:t>2018/9/11</a:t>
+              <a:t>2019/3/3</a:t>
             </a:fld>
             <a:endParaRPr lang="zh-CN" altLang="en-US"/>
           </a:p>
@@ -2753,7 +2828,7 @@
           <a:p>
             <a:fld id="{1ABFA14F-DE9C-4D83-8C58-D4C03BB9FF78}" type="datetimeFigureOut">
               <a:rPr lang="zh-CN" altLang="en-US" smtClean="0"/>
-              <a:t>2018/9/11</a:t>
+              <a:t>2019/3/3</a:t>
             </a:fld>
             <a:endParaRPr lang="zh-CN" altLang="en-US"/>
           </a:p>
@@ -3489,7 +3564,7 @@
           <a:p>
             <a:fld id="{1ABFA14F-DE9C-4D83-8C58-D4C03BB9FF78}" type="datetimeFigureOut">
               <a:rPr lang="zh-CN" altLang="en-US" smtClean="0"/>
-              <a:t>2018/9/11</a:t>
+              <a:t>2019/3/3</a:t>
             </a:fld>
             <a:endParaRPr lang="zh-CN" altLang="en-US"/>
           </a:p>
@@ -3806,7 +3881,7 @@
           <a:p>
             <a:fld id="{1ABFA14F-DE9C-4D83-8C58-D4C03BB9FF78}" type="datetimeFigureOut">
               <a:rPr lang="zh-CN" altLang="en-US" smtClean="0"/>
-              <a:t>2018/9/11</a:t>
+              <a:t>2019/3/3</a:t>
             </a:fld>
             <a:endParaRPr lang="zh-CN" altLang="en-US"/>
           </a:p>
@@ -4402,43 +4477,6 @@
       </p:grpSpPr>
       <p:sp>
         <p:nvSpPr>
-          <p:cNvPr id="4098" name="Rectangle 2"/>
-          <p:cNvSpPr>
-            <a:spLocks noGrp="1" noChangeArrowheads="1"/>
-          </p:cNvSpPr>
-          <p:nvPr>
-            <p:ph type="ctrTitle"/>
-            <p:custDataLst>
-              <p:tags r:id="rId2"/>
-            </p:custDataLst>
-          </p:nvPr>
-        </p:nvSpPr>
-        <p:spPr>
-          <a:xfrm>
-            <a:off x="474665" y="2163765"/>
-            <a:ext cx="6144684" cy="1114424"/>
-          </a:xfrm>
-        </p:spPr>
-        <p:txBody>
-          <a:bodyPr>
-            <a:noAutofit/>
-          </a:bodyPr>
-          <a:lstStyle/>
-          <a:p>
-            <a:r>
-              <a:rPr lang="en-US" altLang="zh-CN" sz="4800" dirty="0"/>
-              <a:t>HTML5</a:t>
-            </a:r>
-            <a:r>
-              <a:rPr lang="zh-CN" altLang="en-US" sz="4800" dirty="0"/>
-              <a:t>程序设计基础</a:t>
-            </a:r>
-            <a:endParaRPr lang="zh-CN" sz="4800" dirty="0"/>
-          </a:p>
-        </p:txBody>
-      </p:sp>
-      <p:sp>
-        <p:nvSpPr>
           <p:cNvPr id="4099" name="Rectangle 3"/>
           <p:cNvSpPr>
             <a:spLocks noGrp="1" noChangeArrowheads="1"/>
@@ -4446,7 +4484,7 @@
           <p:nvPr>
             <p:ph type="subTitle" idx="1"/>
             <p:custDataLst>
-              <p:tags r:id="rId3"/>
+              <p:tags r:id="rId2"/>
             </p:custDataLst>
           </p:nvPr>
         </p:nvSpPr>
@@ -4470,6 +4508,236 @@
               </a:rPr>
               <a:t>第三章 表单</a:t>
             </a:r>
+          </a:p>
+        </p:txBody>
+      </p:sp>
+      <p:sp>
+        <p:nvSpPr>
+          <p:cNvPr id="5" name="Rectangle 2"/>
+          <p:cNvSpPr txBox="1">
+            <a:spLocks noChangeArrowheads="1"/>
+          </p:cNvSpPr>
+          <p:nvPr>
+            <p:custDataLst>
+              <p:tags r:id="rId3"/>
+            </p:custDataLst>
+          </p:nvPr>
+        </p:nvSpPr>
+        <p:spPr bwMode="auto">
+          <a:xfrm>
+            <a:off x="189294" y="2169003"/>
+            <a:ext cx="7032828" cy="1114424"/>
+          </a:xfrm>
+          <a:prstGeom prst="rect">
+            <a:avLst/>
+          </a:prstGeom>
+          <a:noFill/>
+          <a:ln>
+            <a:noFill/>
+          </a:ln>
+          <a:effectLst/>
+          <a:extLst>
+            <a:ext uri="{909E8E84-426E-40DD-AFC4-6F175D3DCCD1}">
+              <a14:hiddenFill xmlns:a14="http://schemas.microsoft.com/office/drawing/2010/main">
+                <a:solidFill>
+                  <a:schemeClr val="accent1"/>
+                </a:solidFill>
+              </a14:hiddenFill>
+            </a:ext>
+            <a:ext uri="{91240B29-F687-4F45-9708-019B960494DF}">
+              <a14:hiddenLine xmlns:a14="http://schemas.microsoft.com/office/drawing/2010/main" w="9525">
+                <a:solidFill>
+                  <a:schemeClr val="tx1"/>
+                </a:solidFill>
+                <a:miter lim="800000"/>
+                <a:headEnd/>
+                <a:tailEnd/>
+              </a14:hiddenLine>
+            </a:ext>
+            <a:ext uri="{AF507438-7753-43E0-B8FC-AC1667EBCBE1}">
+              <a14:hiddenEffects xmlns:a14="http://schemas.microsoft.com/office/drawing/2010/main">
+                <a:effectLst>
+                  <a:outerShdw dist="35921" dir="2700000" algn="ctr" rotWithShape="0">
+                    <a:schemeClr val="bg2"/>
+                  </a:outerShdw>
+                </a:effectLst>
+              </a14:hiddenEffects>
+            </a:ext>
+          </a:extLst>
+        </p:spPr>
+        <p:txBody>
+          <a:bodyPr vert="horz" wrap="square" lIns="91440" tIns="45720" rIns="91440" bIns="45720" numCol="1" anchor="ctr" anchorCtr="0" compatLnSpc="1">
+            <a:noAutofit/>
+          </a:bodyPr>
+          <a:lstStyle>
+            <a:lvl1pPr algn="ctr" rtl="0" eaLnBrk="1" fontAlgn="base" hangingPunct="1">
+              <a:lnSpc>
+                <a:spcPct val="120000"/>
+              </a:lnSpc>
+              <a:spcBef>
+                <a:spcPct val="0"/>
+              </a:spcBef>
+              <a:spcAft>
+                <a:spcPct val="0"/>
+              </a:spcAft>
+              <a:defRPr sz="3200" kern="1200">
+                <a:solidFill>
+                  <a:schemeClr val="accent1">
+                    <a:lumMod val="75000"/>
+                  </a:schemeClr>
+                </a:solidFill>
+                <a:latin typeface="+mj-lt"/>
+                <a:ea typeface="+mj-ea"/>
+                <a:cs typeface="+mj-cs"/>
+              </a:defRPr>
+            </a:lvl1pPr>
+            <a:lvl2pPr algn="l" rtl="0" eaLnBrk="1" fontAlgn="base" hangingPunct="1">
+              <a:spcBef>
+                <a:spcPct val="0"/>
+              </a:spcBef>
+              <a:spcAft>
+                <a:spcPct val="0"/>
+              </a:spcAft>
+              <a:defRPr sz="3200">
+                <a:solidFill>
+                  <a:srgbClr val="3376AD"/>
+                </a:solidFill>
+                <a:latin typeface="Britannic Bold" panose="020B0903060703020204" pitchFamily="34" charset="0"/>
+                <a:ea typeface="微软雅黑" panose="020B0503020204020204" pitchFamily="34" charset="-122"/>
+                <a:cs typeface="宋体" panose="02010600030101010101" pitchFamily="2" charset="-122"/>
+              </a:defRPr>
+            </a:lvl2pPr>
+            <a:lvl3pPr algn="l" rtl="0" eaLnBrk="1" fontAlgn="base" hangingPunct="1">
+              <a:spcBef>
+                <a:spcPct val="0"/>
+              </a:spcBef>
+              <a:spcAft>
+                <a:spcPct val="0"/>
+              </a:spcAft>
+              <a:defRPr sz="3200">
+                <a:solidFill>
+                  <a:srgbClr val="3376AD"/>
+                </a:solidFill>
+                <a:latin typeface="Britannic Bold" panose="020B0903060703020204" pitchFamily="34" charset="0"/>
+                <a:ea typeface="微软雅黑" panose="020B0503020204020204" pitchFamily="34" charset="-122"/>
+                <a:cs typeface="宋体" panose="02010600030101010101" pitchFamily="2" charset="-122"/>
+              </a:defRPr>
+            </a:lvl3pPr>
+            <a:lvl4pPr algn="l" rtl="0" eaLnBrk="1" fontAlgn="base" hangingPunct="1">
+              <a:spcBef>
+                <a:spcPct val="0"/>
+              </a:spcBef>
+              <a:spcAft>
+                <a:spcPct val="0"/>
+              </a:spcAft>
+              <a:defRPr sz="3200">
+                <a:solidFill>
+                  <a:srgbClr val="3376AD"/>
+                </a:solidFill>
+                <a:latin typeface="Britannic Bold" panose="020B0903060703020204" pitchFamily="34" charset="0"/>
+                <a:ea typeface="微软雅黑" panose="020B0503020204020204" pitchFamily="34" charset="-122"/>
+                <a:cs typeface="宋体" panose="02010600030101010101" pitchFamily="2" charset="-122"/>
+              </a:defRPr>
+            </a:lvl4pPr>
+            <a:lvl5pPr algn="l" rtl="0" eaLnBrk="1" fontAlgn="base" hangingPunct="1">
+              <a:spcBef>
+                <a:spcPct val="0"/>
+              </a:spcBef>
+              <a:spcAft>
+                <a:spcPct val="0"/>
+              </a:spcAft>
+              <a:defRPr sz="3200">
+                <a:solidFill>
+                  <a:srgbClr val="3376AD"/>
+                </a:solidFill>
+                <a:latin typeface="Britannic Bold" panose="020B0903060703020204" pitchFamily="34" charset="0"/>
+                <a:ea typeface="微软雅黑" panose="020B0503020204020204" pitchFamily="34" charset="-122"/>
+                <a:cs typeface="宋体" panose="02010600030101010101" pitchFamily="2" charset="-122"/>
+              </a:defRPr>
+            </a:lvl5pPr>
+            <a:lvl6pPr marL="457200" algn="ctr" rtl="0" eaLnBrk="1" fontAlgn="base" hangingPunct="1">
+              <a:spcBef>
+                <a:spcPct val="0"/>
+              </a:spcBef>
+              <a:spcAft>
+                <a:spcPct val="0"/>
+              </a:spcAft>
+              <a:defRPr sz="3200">
+                <a:solidFill>
+                  <a:schemeClr val="tx2"/>
+                </a:solidFill>
+                <a:latin typeface="Arial" panose="020B0604020202020204" pitchFamily="34" charset="0"/>
+                <a:ea typeface="微软雅黑" panose="020B0503020204020204" pitchFamily="34" charset="-122"/>
+                <a:cs typeface="宋体" panose="02010600030101010101" pitchFamily="2" charset="-122"/>
+              </a:defRPr>
+            </a:lvl6pPr>
+            <a:lvl7pPr marL="914400" algn="ctr" rtl="0" eaLnBrk="1" fontAlgn="base" hangingPunct="1">
+              <a:spcBef>
+                <a:spcPct val="0"/>
+              </a:spcBef>
+              <a:spcAft>
+                <a:spcPct val="0"/>
+              </a:spcAft>
+              <a:defRPr sz="3200">
+                <a:solidFill>
+                  <a:schemeClr val="tx2"/>
+                </a:solidFill>
+                <a:latin typeface="Arial" panose="020B0604020202020204" pitchFamily="34" charset="0"/>
+                <a:ea typeface="微软雅黑" panose="020B0503020204020204" pitchFamily="34" charset="-122"/>
+                <a:cs typeface="宋体" panose="02010600030101010101" pitchFamily="2" charset="-122"/>
+              </a:defRPr>
+            </a:lvl7pPr>
+            <a:lvl8pPr marL="1371600" algn="ctr" rtl="0" eaLnBrk="1" fontAlgn="base" hangingPunct="1">
+              <a:spcBef>
+                <a:spcPct val="0"/>
+              </a:spcBef>
+              <a:spcAft>
+                <a:spcPct val="0"/>
+              </a:spcAft>
+              <a:defRPr sz="3200">
+                <a:solidFill>
+                  <a:schemeClr val="tx2"/>
+                </a:solidFill>
+                <a:latin typeface="Arial" panose="020B0604020202020204" pitchFamily="34" charset="0"/>
+                <a:ea typeface="微软雅黑" panose="020B0503020204020204" pitchFamily="34" charset="-122"/>
+                <a:cs typeface="宋体" panose="02010600030101010101" pitchFamily="2" charset="-122"/>
+              </a:defRPr>
+            </a:lvl8pPr>
+            <a:lvl9pPr marL="1828800" algn="ctr" rtl="0" eaLnBrk="1" fontAlgn="base" hangingPunct="1">
+              <a:spcBef>
+                <a:spcPct val="0"/>
+              </a:spcBef>
+              <a:spcAft>
+                <a:spcPct val="0"/>
+              </a:spcAft>
+              <a:defRPr sz="3200">
+                <a:solidFill>
+                  <a:schemeClr val="tx2"/>
+                </a:solidFill>
+                <a:latin typeface="Arial" panose="020B0604020202020204" pitchFamily="34" charset="0"/>
+                <a:ea typeface="微软雅黑" panose="020B0503020204020204" pitchFamily="34" charset="-122"/>
+                <a:cs typeface="宋体" panose="02010600030101010101" pitchFamily="2" charset="-122"/>
+              </a:defRPr>
+            </a:lvl9pPr>
+          </a:lstStyle>
+          <a:p>
+            <a:r>
+              <a:rPr lang="da-DK" altLang="zh-CN" sz="4800" smtClean="0"/>
+              <a:t>HTML5</a:t>
+            </a:r>
+            <a:r>
+              <a:rPr lang="zh-CN" altLang="en-US" sz="4800" smtClean="0"/>
+              <a:t>与</a:t>
+            </a:r>
+            <a:r>
+              <a:rPr lang="en-US" altLang="zh-CN" sz="4800" smtClean="0"/>
+              <a:t>CSS3</a:t>
+            </a:r>
+            <a:r>
+              <a:rPr lang="zh-CN" altLang="en-US" sz="4800" smtClean="0"/>
+              <a:t>前端开发</a:t>
+            </a:r>
+            <a:endParaRPr lang="zh-CN" sz="4800" dirty="0"/>
           </a:p>
         </p:txBody>
       </p:sp>
@@ -8818,6 +9086,70 @@
           </a:p>
         </p:txBody>
       </p:sp>
+      <p:pic>
+        <p:nvPicPr>
+          <p:cNvPr id="1026" name="Picture 2"/>
+          <p:cNvPicPr>
+            <a:picLocks noChangeAspect="1" noChangeArrowheads="1"/>
+          </p:cNvPicPr>
+          <p:nvPr/>
+        </p:nvPicPr>
+        <p:blipFill>
+          <a:blip r:embed="rId5">
+            <a:extLst>
+              <a:ext uri="{28A0092B-C50C-407E-A947-70E740481C1C}">
+                <a14:useLocalDpi xmlns:a14="http://schemas.microsoft.com/office/drawing/2010/main" val="0"/>
+              </a:ext>
+            </a:extLst>
+          </a:blip>
+          <a:srcRect/>
+          <a:stretch>
+            <a:fillRect/>
+          </a:stretch>
+        </p:blipFill>
+        <p:spPr bwMode="auto">
+          <a:xfrm>
+            <a:off x="1234338" y="3717131"/>
+            <a:ext cx="1404078" cy="1628547"/>
+          </a:xfrm>
+          <a:prstGeom prst="rect">
+            <a:avLst/>
+          </a:prstGeom>
+          <a:noFill/>
+          <a:ln>
+            <a:noFill/>
+          </a:ln>
+          <a:effectLst/>
+          <a:extLst>
+            <a:ext uri="{909E8E84-426E-40DD-AFC4-6F175D3DCCD1}">
+              <a14:hiddenFill xmlns:a14="http://schemas.microsoft.com/office/drawing/2010/main">
+                <a:solidFill>
+                  <a:schemeClr val="accent1"/>
+                </a:solidFill>
+              </a14:hiddenFill>
+            </a:ext>
+            <a:ext uri="{91240B29-F687-4F45-9708-019B960494DF}">
+              <a14:hiddenLine xmlns:a14="http://schemas.microsoft.com/office/drawing/2010/main" w="9525">
+                <a:solidFill>
+                  <a:schemeClr val="tx1"/>
+                </a:solidFill>
+                <a:miter lim="800000"/>
+                <a:headEnd/>
+                <a:tailEnd/>
+              </a14:hiddenLine>
+            </a:ext>
+            <a:ext uri="{AF507438-7753-43E0-B8FC-AC1667EBCBE1}">
+              <a14:hiddenEffects xmlns:a14="http://schemas.microsoft.com/office/drawing/2010/main">
+                <a:effectLst>
+                  <a:outerShdw dist="35921" dir="2700000" algn="ctr" rotWithShape="0">
+                    <a:schemeClr val="bg2"/>
+                  </a:outerShdw>
+                </a:effectLst>
+              </a14:hiddenEffects>
+            </a:ext>
+          </a:extLst>
+        </p:spPr>
+      </p:pic>
     </p:spTree>
     <p:extLst>
       <p:ext uri="{BB962C8B-B14F-4D97-AF65-F5344CB8AC3E}">
@@ -8883,6 +9215,41 @@
                                   </p:childTnLst>
                                 </p:cTn>
                               </p:par>
+                              <p:par>
+                                <p:cTn id="8" presetID="10" presetClass="entr" presetSubtype="0" fill="hold" nodeType="withEffect">
+                                  <p:stCondLst>
+                                    <p:cond delay="0"/>
+                                  </p:stCondLst>
+                                  <p:childTnLst>
+                                    <p:set>
+                                      <p:cBhvr>
+                                        <p:cTn id="9" dur="1" fill="hold">
+                                          <p:stCondLst>
+                                            <p:cond delay="0"/>
+                                          </p:stCondLst>
+                                        </p:cTn>
+                                        <p:tgtEl>
+                                          <p:spTgt spid="1026"/>
+                                        </p:tgtEl>
+                                        <p:attrNameLst>
+                                          <p:attrName>style.visibility</p:attrName>
+                                        </p:attrNameLst>
+                                      </p:cBhvr>
+                                      <p:to>
+                                        <p:strVal val="visible"/>
+                                      </p:to>
+                                    </p:set>
+                                    <p:animEffect transition="in" filter="fade">
+                                      <p:cBhvr>
+                                        <p:cTn id="10" dur="500"/>
+                                        <p:tgtEl>
+                                          <p:spTgt spid="1026"/>
+                                        </p:tgtEl>
+                                      </p:cBhvr>
+                                    </p:animEffect>
+                                  </p:childTnLst>
+                                </p:cTn>
+                              </p:par>
                             </p:childTnLst>
                           </p:cTn>
                         </p:par>
@@ -8890,26 +9257,26 @@
                     </p:cTn>
                   </p:par>
                   <p:par>
-                    <p:cTn id="8" fill="hold">
+                    <p:cTn id="11" fill="hold">
                       <p:stCondLst>
                         <p:cond delay="indefinite"/>
                       </p:stCondLst>
                       <p:childTnLst>
                         <p:par>
-                          <p:cTn id="9" fill="hold">
+                          <p:cTn id="12" fill="hold">
                             <p:stCondLst>
                               <p:cond delay="0"/>
                             </p:stCondLst>
                             <p:childTnLst>
                               <p:par>
-                                <p:cTn id="10" presetID="16" presetClass="entr" presetSubtype="21" fill="hold" grpId="0" nodeType="clickEffect">
+                                <p:cTn id="13" presetID="16" presetClass="entr" presetSubtype="21" fill="hold" grpId="0" nodeType="clickEffect">
                                   <p:stCondLst>
                                     <p:cond delay="0"/>
                                   </p:stCondLst>
                                   <p:childTnLst>
                                     <p:set>
                                       <p:cBhvr>
-                                        <p:cTn id="11" dur="1" fill="hold">
+                                        <p:cTn id="14" dur="1" fill="hold">
                                           <p:stCondLst>
                                             <p:cond delay="0"/>
                                           </p:stCondLst>
@@ -8927,7 +9294,7 @@
                                     </p:set>
                                     <p:animEffect transition="in" filter="barn(inVertical)">
                                       <p:cBhvr>
-                                        <p:cTn id="12" dur="500"/>
+                                        <p:cTn id="15" dur="500"/>
                                         <p:tgtEl>
                                           <p:spTgt spid="9"/>
                                         </p:tgtEl>
@@ -8943,26 +9310,26 @@
                     </p:cTn>
                   </p:par>
                   <p:par>
-                    <p:cTn id="13" fill="hold">
+                    <p:cTn id="16" fill="hold">
                       <p:stCondLst>
                         <p:cond delay="indefinite"/>
                       </p:stCondLst>
                       <p:childTnLst>
                         <p:par>
-                          <p:cTn id="14" fill="hold">
+                          <p:cTn id="17" fill="hold">
                             <p:stCondLst>
                               <p:cond delay="0"/>
                             </p:stCondLst>
                             <p:childTnLst>
                               <p:par>
-                                <p:cTn id="15" presetID="10" presetClass="entr" presetSubtype="0" fill="hold" nodeType="clickEffect">
+                                <p:cTn id="18" presetID="10" presetClass="entr" presetSubtype="0" fill="hold" nodeType="clickEffect">
                                   <p:stCondLst>
                                     <p:cond delay="0"/>
                                   </p:stCondLst>
                                   <p:childTnLst>
                                     <p:set>
                                       <p:cBhvr>
-                                        <p:cTn id="16" dur="1" fill="hold">
+                                        <p:cTn id="19" dur="1" fill="hold">
                                           <p:stCondLst>
                                             <p:cond delay="0"/>
                                           </p:stCondLst>
@@ -8980,7 +9347,7 @@
                                     </p:set>
                                     <p:animEffect transition="in" filter="fade">
                                       <p:cBhvr>
-                                        <p:cTn id="17" dur="500"/>
+                                        <p:cTn id="20" dur="500"/>
                                         <p:tgtEl>
                                           <p:spTgt spid="6"/>
                                         </p:tgtEl>
@@ -8996,26 +9363,26 @@
                     </p:cTn>
                   </p:par>
                   <p:par>
-                    <p:cTn id="18" fill="hold">
+                    <p:cTn id="21" fill="hold">
                       <p:stCondLst>
                         <p:cond delay="indefinite"/>
                       </p:stCondLst>
                       <p:childTnLst>
                         <p:par>
-                          <p:cTn id="19" fill="hold">
+                          <p:cTn id="22" fill="hold">
                             <p:stCondLst>
                               <p:cond delay="0"/>
                             </p:stCondLst>
                             <p:childTnLst>
                               <p:par>
-                                <p:cTn id="20" presetID="16" presetClass="entr" presetSubtype="21" fill="hold" grpId="0" nodeType="clickEffect">
+                                <p:cTn id="23" presetID="16" presetClass="entr" presetSubtype="21" fill="hold" grpId="0" nodeType="clickEffect">
                                   <p:stCondLst>
                                     <p:cond delay="0"/>
                                   </p:stCondLst>
                                   <p:childTnLst>
                                     <p:set>
                                       <p:cBhvr>
-                                        <p:cTn id="21" dur="1" fill="hold">
+                                        <p:cTn id="24" dur="1" fill="hold">
                                           <p:stCondLst>
                                             <p:cond delay="0"/>
                                           </p:stCondLst>
@@ -9033,7 +9400,7 @@
                                     </p:set>
                                     <p:animEffect transition="in" filter="barn(inVertical)">
                                       <p:cBhvr>
-                                        <p:cTn id="22" dur="500"/>
+                                        <p:cTn id="25" dur="500"/>
                                         <p:tgtEl>
                                           <p:spTgt spid="11"/>
                                         </p:tgtEl>
@@ -9049,26 +9416,26 @@
                     </p:cTn>
                   </p:par>
                   <p:par>
-                    <p:cTn id="23" fill="hold">
+                    <p:cTn id="26" fill="hold">
                       <p:stCondLst>
                         <p:cond delay="indefinite"/>
                       </p:stCondLst>
                       <p:childTnLst>
                         <p:par>
-                          <p:cTn id="24" fill="hold">
+                          <p:cTn id="27" fill="hold">
                             <p:stCondLst>
                               <p:cond delay="0"/>
                             </p:stCondLst>
                             <p:childTnLst>
                               <p:par>
-                                <p:cTn id="25" presetID="16" presetClass="entr" presetSubtype="21" fill="hold" grpId="0" nodeType="clickEffect">
+                                <p:cTn id="28" presetID="16" presetClass="entr" presetSubtype="21" fill="hold" grpId="0" nodeType="clickEffect">
                                   <p:stCondLst>
                                     <p:cond delay="0"/>
                                   </p:stCondLst>
                                   <p:childTnLst>
                                     <p:set>
                                       <p:cBhvr>
-                                        <p:cTn id="26" dur="1" fill="hold">
+                                        <p:cTn id="29" dur="1" fill="hold">
                                           <p:stCondLst>
                                             <p:cond delay="0"/>
                                           </p:stCondLst>
@@ -9086,7 +9453,7 @@
                                     </p:set>
                                     <p:animEffect transition="in" filter="barn(inVertical)">
                                       <p:cBhvr>
-                                        <p:cTn id="27" dur="500"/>
+                                        <p:cTn id="30" dur="500"/>
                                         <p:tgtEl>
                                           <p:spTgt spid="13"/>
                                         </p:tgtEl>
@@ -9096,14 +9463,14 @@
                                 </p:cTn>
                               </p:par>
                               <p:par>
-                                <p:cTn id="28" presetID="16" presetClass="entr" presetSubtype="21" fill="hold" grpId="0" nodeType="withEffect">
+                                <p:cTn id="31" presetID="16" presetClass="entr" presetSubtype="21" fill="hold" grpId="0" nodeType="withEffect">
                                   <p:stCondLst>
                                     <p:cond delay="0"/>
                                   </p:stCondLst>
                                   <p:childTnLst>
                                     <p:set>
                                       <p:cBhvr>
-                                        <p:cTn id="29" dur="1" fill="hold">
+                                        <p:cTn id="32" dur="1" fill="hold">
                                           <p:stCondLst>
                                             <p:cond delay="0"/>
                                           </p:stCondLst>
@@ -9121,7 +9488,7 @@
                                     </p:set>
                                     <p:animEffect transition="in" filter="barn(inVertical)">
                                       <p:cBhvr>
-                                        <p:cTn id="30" dur="500"/>
+                                        <p:cTn id="33" dur="500"/>
                                         <p:tgtEl>
                                           <p:spTgt spid="12"/>
                                         </p:tgtEl>
@@ -9238,14 +9605,14 @@
                 <a:gridCol w="2344481">
                   <a:extLst>
                     <a:ext uri="{9D8B030D-6E8A-4147-A177-3AD203B41FA5}">
-                      <a16:colId xmlns:a16="http://schemas.microsoft.com/office/drawing/2014/main" val="20000"/>
+                      <a16:colId xmlns:a16="http://schemas.microsoft.com/office/drawing/2014/main" xmlns="" val="20000"/>
                     </a:ext>
                   </a:extLst>
                 </a:gridCol>
                 <a:gridCol w="6515578">
                   <a:extLst>
                     <a:ext uri="{9D8B030D-6E8A-4147-A177-3AD203B41FA5}">
-                      <a16:colId xmlns:a16="http://schemas.microsoft.com/office/drawing/2014/main" val="20001"/>
+                      <a16:colId xmlns:a16="http://schemas.microsoft.com/office/drawing/2014/main" xmlns="" val="20001"/>
                     </a:ext>
                   </a:extLst>
                 </a:gridCol>
@@ -9299,7 +9666,7 @@
                 </a:tc>
                 <a:extLst>
                   <a:ext uri="{0D108BD9-81ED-4DB2-BD59-A6C34878D82A}">
-                    <a16:rowId xmlns:a16="http://schemas.microsoft.com/office/drawing/2014/main" val="10000"/>
+                    <a16:rowId xmlns:a16="http://schemas.microsoft.com/office/drawing/2014/main" xmlns="" val="10000"/>
                   </a:ext>
                 </a:extLst>
               </a:tr>
@@ -9387,7 +9754,7 @@
                 </a:tc>
                 <a:extLst>
                   <a:ext uri="{0D108BD9-81ED-4DB2-BD59-A6C34878D82A}">
-                    <a16:rowId xmlns:a16="http://schemas.microsoft.com/office/drawing/2014/main" val="10001"/>
+                    <a16:rowId xmlns:a16="http://schemas.microsoft.com/office/drawing/2014/main" xmlns="" val="10001"/>
                   </a:ext>
                 </a:extLst>
               </a:tr>
@@ -9520,7 +9887,7 @@
                 </a:tc>
                 <a:extLst>
                   <a:ext uri="{0D108BD9-81ED-4DB2-BD59-A6C34878D82A}">
-                    <a16:rowId xmlns:a16="http://schemas.microsoft.com/office/drawing/2014/main" val="10002"/>
+                    <a16:rowId xmlns:a16="http://schemas.microsoft.com/office/drawing/2014/main" xmlns="" val="10002"/>
                   </a:ext>
                 </a:extLst>
               </a:tr>
@@ -9673,7 +10040,7 @@
                 </a:tc>
                 <a:extLst>
                   <a:ext uri="{0D108BD9-81ED-4DB2-BD59-A6C34878D82A}">
-                    <a16:rowId xmlns:a16="http://schemas.microsoft.com/office/drawing/2014/main" val="10003"/>
+                    <a16:rowId xmlns:a16="http://schemas.microsoft.com/office/drawing/2014/main" xmlns="" val="10003"/>
                   </a:ext>
                 </a:extLst>
               </a:tr>
@@ -9751,7 +10118,7 @@
                 </a:tc>
                 <a:extLst>
                   <a:ext uri="{0D108BD9-81ED-4DB2-BD59-A6C34878D82A}">
-                    <a16:rowId xmlns:a16="http://schemas.microsoft.com/office/drawing/2014/main" val="10004"/>
+                    <a16:rowId xmlns:a16="http://schemas.microsoft.com/office/drawing/2014/main" xmlns="" val="10004"/>
                   </a:ext>
                 </a:extLst>
               </a:tr>
@@ -9850,14 +10217,14 @@
                 <a:gridCol w="2325420">
                   <a:extLst>
                     <a:ext uri="{9D8B030D-6E8A-4147-A177-3AD203B41FA5}">
-                      <a16:colId xmlns:a16="http://schemas.microsoft.com/office/drawing/2014/main" val="20000"/>
+                      <a16:colId xmlns:a16="http://schemas.microsoft.com/office/drawing/2014/main" xmlns="" val="20000"/>
                     </a:ext>
                   </a:extLst>
                 </a:gridCol>
                 <a:gridCol w="6462605">
                   <a:extLst>
                     <a:ext uri="{9D8B030D-6E8A-4147-A177-3AD203B41FA5}">
-                      <a16:colId xmlns:a16="http://schemas.microsoft.com/office/drawing/2014/main" val="20001"/>
+                      <a16:colId xmlns:a16="http://schemas.microsoft.com/office/drawing/2014/main" xmlns="" val="20001"/>
                     </a:ext>
                   </a:extLst>
                 </a:gridCol>
@@ -9907,7 +10274,7 @@
                 </a:tc>
                 <a:extLst>
                   <a:ext uri="{0D108BD9-81ED-4DB2-BD59-A6C34878D82A}">
-                    <a16:rowId xmlns:a16="http://schemas.microsoft.com/office/drawing/2014/main" val="10000"/>
+                    <a16:rowId xmlns:a16="http://schemas.microsoft.com/office/drawing/2014/main" xmlns="" val="10000"/>
                   </a:ext>
                 </a:extLst>
               </a:tr>
@@ -9993,7 +10360,7 @@
                 </a:tc>
                 <a:extLst>
                   <a:ext uri="{0D108BD9-81ED-4DB2-BD59-A6C34878D82A}">
-                    <a16:rowId xmlns:a16="http://schemas.microsoft.com/office/drawing/2014/main" val="10001"/>
+                    <a16:rowId xmlns:a16="http://schemas.microsoft.com/office/drawing/2014/main" xmlns="" val="10001"/>
                   </a:ext>
                 </a:extLst>
               </a:tr>
@@ -10099,7 +10466,7 @@
                 </a:tc>
                 <a:extLst>
                   <a:ext uri="{0D108BD9-81ED-4DB2-BD59-A6C34878D82A}">
-                    <a16:rowId xmlns:a16="http://schemas.microsoft.com/office/drawing/2014/main" val="10002"/>
+                    <a16:rowId xmlns:a16="http://schemas.microsoft.com/office/drawing/2014/main" xmlns="" val="10002"/>
                   </a:ext>
                 </a:extLst>
               </a:tr>
@@ -10192,7 +10559,7 @@
                 </a:tc>
                 <a:extLst>
                   <a:ext uri="{0D108BD9-81ED-4DB2-BD59-A6C34878D82A}">
-                    <a16:rowId xmlns:a16="http://schemas.microsoft.com/office/drawing/2014/main" val="10003"/>
+                    <a16:rowId xmlns:a16="http://schemas.microsoft.com/office/drawing/2014/main" xmlns="" val="10003"/>
                   </a:ext>
                 </a:extLst>
               </a:tr>
@@ -10291,14 +10658,14 @@
                 <a:gridCol w="2524089">
                   <a:extLst>
                     <a:ext uri="{9D8B030D-6E8A-4147-A177-3AD203B41FA5}">
-                      <a16:colId xmlns:a16="http://schemas.microsoft.com/office/drawing/2014/main" val="20000"/>
+                      <a16:colId xmlns:a16="http://schemas.microsoft.com/office/drawing/2014/main" xmlns="" val="20000"/>
                     </a:ext>
                   </a:extLst>
                 </a:gridCol>
                 <a:gridCol w="5343561">
                   <a:extLst>
                     <a:ext uri="{9D8B030D-6E8A-4147-A177-3AD203B41FA5}">
-                      <a16:colId xmlns:a16="http://schemas.microsoft.com/office/drawing/2014/main" val="20001"/>
+                      <a16:colId xmlns:a16="http://schemas.microsoft.com/office/drawing/2014/main" xmlns="" val="20001"/>
                     </a:ext>
                   </a:extLst>
                 </a:gridCol>
@@ -10348,7 +10715,7 @@
                 </a:tc>
                 <a:extLst>
                   <a:ext uri="{0D108BD9-81ED-4DB2-BD59-A6C34878D82A}">
-                    <a16:rowId xmlns:a16="http://schemas.microsoft.com/office/drawing/2014/main" val="10000"/>
+                    <a16:rowId xmlns:a16="http://schemas.microsoft.com/office/drawing/2014/main" xmlns="" val="10000"/>
                   </a:ext>
                 </a:extLst>
               </a:tr>
@@ -10425,7 +10792,7 @@
                 </a:tc>
                 <a:extLst>
                   <a:ext uri="{0D108BD9-81ED-4DB2-BD59-A6C34878D82A}">
-                    <a16:rowId xmlns:a16="http://schemas.microsoft.com/office/drawing/2014/main" val="10001"/>
+                    <a16:rowId xmlns:a16="http://schemas.microsoft.com/office/drawing/2014/main" xmlns="" val="10001"/>
                   </a:ext>
                 </a:extLst>
               </a:tr>
@@ -10520,7 +10887,7 @@
                 </a:tc>
                 <a:extLst>
                   <a:ext uri="{0D108BD9-81ED-4DB2-BD59-A6C34878D82A}">
-                    <a16:rowId xmlns:a16="http://schemas.microsoft.com/office/drawing/2014/main" val="10002"/>
+                    <a16:rowId xmlns:a16="http://schemas.microsoft.com/office/drawing/2014/main" xmlns="" val="10002"/>
                   </a:ext>
                 </a:extLst>
               </a:tr>
@@ -10615,7 +10982,7 @@
                 </a:tc>
                 <a:extLst>
                   <a:ext uri="{0D108BD9-81ED-4DB2-BD59-A6C34878D82A}">
-                    <a16:rowId xmlns:a16="http://schemas.microsoft.com/office/drawing/2014/main" val="10003"/>
+                    <a16:rowId xmlns:a16="http://schemas.microsoft.com/office/drawing/2014/main" xmlns="" val="10003"/>
                   </a:ext>
                 </a:extLst>
               </a:tr>
@@ -10710,7 +11077,7 @@
                 </a:tc>
                 <a:extLst>
                   <a:ext uri="{0D108BD9-81ED-4DB2-BD59-A6C34878D82A}">
-                    <a16:rowId xmlns:a16="http://schemas.microsoft.com/office/drawing/2014/main" val="10004"/>
+                    <a16:rowId xmlns:a16="http://schemas.microsoft.com/office/drawing/2014/main" xmlns="" val="10004"/>
                   </a:ext>
                 </a:extLst>
               </a:tr>
@@ -10813,7 +11180,7 @@
                 </a:tc>
                 <a:extLst>
                   <a:ext uri="{0D108BD9-81ED-4DB2-BD59-A6C34878D82A}">
-                    <a16:rowId xmlns:a16="http://schemas.microsoft.com/office/drawing/2014/main" val="10005"/>
+                    <a16:rowId xmlns:a16="http://schemas.microsoft.com/office/drawing/2014/main" xmlns="" val="10005"/>
                   </a:ext>
                 </a:extLst>
               </a:tr>
@@ -11452,32 +11819,7 @@
                 <a:latin typeface="微软雅黑" panose="020B0503020204020204" pitchFamily="34" charset="-122"/>
                 <a:ea typeface="微软雅黑" panose="020B0503020204020204" pitchFamily="34" charset="-122"/>
               </a:rPr>
-              <a:t>在之前的HTML表单标签中，对于一些功能支持的不够好。</a:t>
-            </a:r>
-            <a:endParaRPr kumimoji="0" lang="en-US" altLang="zh-CN" dirty="0" smtClean="0">
-              <a:solidFill>
-                <a:srgbClr val="000000"/>
-              </a:solidFill>
-              <a:latin typeface="微软雅黑" panose="020B0503020204020204" pitchFamily="34" charset="-122"/>
-              <a:ea typeface="微软雅黑" panose="020B0503020204020204" pitchFamily="34" charset="-122"/>
-            </a:endParaRPr>
-          </a:p>
-          <a:p>
-            <a:pPr marL="0" indent="0">
-              <a:lnSpc>
-                <a:spcPct val="130000"/>
-              </a:lnSpc>
-              <a:buNone/>
-            </a:pPr>
-            <a:r>
-              <a:rPr kumimoji="0" lang="zh-CN" altLang="en-US" dirty="0" smtClean="0">
-                <a:solidFill>
-                  <a:srgbClr val="000000"/>
-                </a:solidFill>
-                <a:latin typeface="微软雅黑" panose="020B0503020204020204" pitchFamily="34" charset="-122"/>
-                <a:ea typeface="微软雅黑" panose="020B0503020204020204" pitchFamily="34" charset="-122"/>
-              </a:rPr>
-              <a:t>比如：</a:t>
+              <a:t>在之前的HTML表单标签中，对于一些功能支持的不够好。如：</a:t>
             </a:r>
             <a:endParaRPr kumimoji="0" lang="en-US" altLang="zh-CN" dirty="0" smtClean="0">
               <a:solidFill>
@@ -11885,7 +12227,12 @@
             <p:ph sz="quarter" idx="10"/>
           </p:nvPr>
         </p:nvSpPr>
-        <p:spPr/>
+        <p:spPr>
+          <a:xfrm>
+            <a:off x="694974" y="2564604"/>
+            <a:ext cx="11064898" cy="4033848"/>
+          </a:xfrm>
+        </p:spPr>
         <p:txBody>
           <a:bodyPr/>
           <a:lstStyle/>
@@ -11915,7 +12262,43 @@
             <a:pPr lvl="1"/>
             <a:r>
               <a:rPr lang="zh-CN" altLang="en-US" dirty="0"/>
-              <a:t>列表通过 </a:t>
+              <a:t>一般和</a:t>
+            </a:r>
+            <a:r>
+              <a:rPr lang="en-US" altLang="zh-CN" dirty="0"/>
+              <a:t>&lt;input&gt;</a:t>
+            </a:r>
+            <a:r>
+              <a:rPr lang="zh-CN" altLang="en-US" dirty="0"/>
+              <a:t>标签配合使用</a:t>
+            </a:r>
+            <a:r>
+              <a:rPr lang="zh-CN" altLang="en-US" dirty="0" smtClean="0"/>
+              <a:t>，来</a:t>
+            </a:r>
+            <a:r>
+              <a:rPr lang="zh-CN" altLang="en-US" dirty="0"/>
+              <a:t>设置</a:t>
+            </a:r>
+            <a:r>
+              <a:rPr lang="en-US" altLang="zh-CN" dirty="0"/>
+              <a:t>&lt;input&gt;</a:t>
+            </a:r>
+            <a:r>
+              <a:rPr lang="zh-CN" altLang="en-US" dirty="0"/>
+              <a:t>可能的</a:t>
+            </a:r>
+            <a:r>
+              <a:rPr lang="zh-CN" altLang="en-US" dirty="0" smtClean="0"/>
+              <a:t>值。</a:t>
+            </a:r>
+            <a:endParaRPr lang="en-US" altLang="zh-CN" dirty="0" smtClean="0"/>
+          </a:p>
+          <a:p>
+            <a:pPr lvl="1"/>
+            <a:r>
+              <a:rPr lang="zh-CN" altLang="en-US" dirty="0"/>
+              <a:t>把 </a:t>
             </a:r>
             <a:r>
               <a:rPr lang="en-US" altLang="zh-CN" dirty="0" err="1"/>
@@ -11927,6 +12310,58 @@
             </a:r>
             <a:r>
               <a:rPr lang="zh-CN" altLang="en-US" dirty="0"/>
+              <a:t>绑定到输入域，需将输入域的 </a:t>
+            </a:r>
+            <a:r>
+              <a:rPr lang="en-US" altLang="zh-CN" dirty="0"/>
+              <a:t>list </a:t>
+            </a:r>
+            <a:r>
+              <a:rPr lang="zh-CN" altLang="en-US" dirty="0"/>
+              <a:t>属性引用 </a:t>
+            </a:r>
+            <a:r>
+              <a:rPr lang="en-US" altLang="zh-CN" dirty="0" err="1"/>
+              <a:t>datalist</a:t>
+            </a:r>
+            <a:r>
+              <a:rPr lang="en-US" altLang="zh-CN" dirty="0"/>
+              <a:t> </a:t>
+            </a:r>
+            <a:r>
+              <a:rPr lang="zh-CN" altLang="en-US" dirty="0"/>
+              <a:t>的 </a:t>
+            </a:r>
+            <a:r>
+              <a:rPr lang="en-US" altLang="zh-CN" dirty="0"/>
+              <a:t>id</a:t>
+            </a:r>
+            <a:r>
+              <a:rPr lang="zh-CN" altLang="en-US" dirty="0"/>
+              <a:t>。</a:t>
+            </a:r>
+            <a:endParaRPr lang="en-US" altLang="zh-CN" dirty="0"/>
+          </a:p>
+          <a:p>
+            <a:pPr lvl="1"/>
+            <a:r>
+              <a:rPr lang="zh-CN" altLang="en-US" dirty="0" smtClean="0"/>
+              <a:t>列表</a:t>
+            </a:r>
+            <a:r>
+              <a:rPr lang="zh-CN" altLang="en-US" dirty="0"/>
+              <a:t>通过 </a:t>
+            </a:r>
+            <a:r>
+              <a:rPr lang="en-US" altLang="zh-CN" dirty="0" err="1"/>
+              <a:t>datalist</a:t>
+            </a:r>
+            <a:r>
+              <a:rPr lang="en-US" altLang="zh-CN" dirty="0"/>
+              <a:t> </a:t>
+            </a:r>
+            <a:r>
+              <a:rPr lang="zh-CN" altLang="en-US" dirty="0"/>
               <a:t>中的 </a:t>
             </a:r>
             <a:r>
@@ -11941,55 +12376,7 @@
           <a:p>
             <a:pPr lvl="1"/>
             <a:r>
-              <a:rPr lang="zh-CN" altLang="en-US" dirty="0"/>
-              <a:t>把 </a:t>
-            </a:r>
-            <a:r>
-              <a:rPr lang="en-US" altLang="zh-CN" dirty="0" err="1"/>
-              <a:t>datalist</a:t>
-            </a:r>
-            <a:r>
-              <a:rPr lang="en-US" altLang="zh-CN" dirty="0"/>
-              <a:t> </a:t>
-            </a:r>
-            <a:r>
-              <a:rPr lang="zh-CN" altLang="en-US" dirty="0"/>
-              <a:t>绑定到输入域，需将输入域的 </a:t>
-            </a:r>
-            <a:r>
-              <a:rPr lang="en-US" altLang="zh-CN" dirty="0"/>
-              <a:t>list </a:t>
-            </a:r>
-            <a:r>
-              <a:rPr lang="zh-CN" altLang="en-US" dirty="0"/>
-              <a:t>属性引用 </a:t>
-            </a:r>
-            <a:r>
-              <a:rPr lang="en-US" altLang="zh-CN" dirty="0" err="1"/>
-              <a:t>datalist</a:t>
-            </a:r>
-            <a:r>
-              <a:rPr lang="en-US" altLang="zh-CN" dirty="0"/>
-              <a:t> </a:t>
-            </a:r>
-            <a:r>
-              <a:rPr lang="zh-CN" altLang="en-US" dirty="0"/>
-              <a:t>的 </a:t>
-            </a:r>
-            <a:r>
-              <a:rPr lang="en-US" altLang="zh-CN" dirty="0"/>
-              <a:t>id</a:t>
-            </a:r>
-            <a:r>
-              <a:rPr lang="zh-CN" altLang="en-US" dirty="0" smtClean="0"/>
-              <a:t>。</a:t>
-            </a:r>
-            <a:endParaRPr lang="en-US" altLang="zh-CN" dirty="0" smtClean="0"/>
-          </a:p>
-          <a:p>
-            <a:pPr lvl="1"/>
-            <a:r>
-              <a:rPr lang="zh-CN" altLang="en-US" dirty="0">
+              <a:rPr lang="zh-CN" altLang="en-US" dirty="0" smtClean="0">
                 <a:solidFill>
                   <a:srgbClr val="C00000"/>
                 </a:solidFill>
@@ -12066,6 +12453,40 @@
           </a:p>
         </p:txBody>
       </p:sp>
+      <p:pic>
+        <p:nvPicPr>
+          <p:cNvPr id="4" name="图片 3"/>
+          <p:cNvPicPr>
+            <a:picLocks noChangeAspect="1"/>
+          </p:cNvPicPr>
+          <p:nvPr/>
+        </p:nvPicPr>
+        <p:blipFill>
+          <a:blip r:embed="rId2"/>
+          <a:stretch>
+            <a:fillRect/>
+          </a:stretch>
+        </p:blipFill>
+        <p:spPr>
+          <a:xfrm>
+            <a:off x="909624" y="1384352"/>
+            <a:ext cx="6387808" cy="918564"/>
+          </a:xfrm>
+          <a:prstGeom prst="rect">
+            <a:avLst/>
+          </a:prstGeom>
+          <a:ln>
+            <a:noFill/>
+          </a:ln>
+          <a:effectLst>
+            <a:outerShdw blurRad="190500" algn="tl" rotWithShape="0">
+              <a:srgbClr val="000000">
+                <a:alpha val="70000"/>
+              </a:srgbClr>
+            </a:outerShdw>
+          </a:effectLst>
+        </p:spPr>
+      </p:pic>
     </p:spTree>
     <p:extLst>
       <p:ext uri="{BB962C8B-B14F-4D97-AF65-F5344CB8AC3E}">
@@ -12079,7 +12500,503 @@
   <p:timing>
     <p:tnLst>
       <p:par>
-        <p:cTn id="1" dur="indefinite" restart="never" nodeType="tmRoot"/>
+        <p:cTn id="1" dur="indefinite" restart="never" nodeType="tmRoot">
+          <p:childTnLst>
+            <p:seq concurrent="1" nextAc="seek">
+              <p:cTn id="2" dur="indefinite" nodeType="mainSeq">
+                <p:childTnLst>
+                  <p:par>
+                    <p:cTn id="3" fill="hold">
+                      <p:stCondLst>
+                        <p:cond delay="indefinite"/>
+                      </p:stCondLst>
+                      <p:childTnLst>
+                        <p:par>
+                          <p:cTn id="4" fill="hold">
+                            <p:stCondLst>
+                              <p:cond delay="0"/>
+                            </p:stCondLst>
+                            <p:childTnLst>
+                              <p:par>
+                                <p:cTn id="5" presetID="42" presetClass="entr" presetSubtype="0" fill="hold" nodeType="clickEffect">
+                                  <p:stCondLst>
+                                    <p:cond delay="0"/>
+                                  </p:stCondLst>
+                                  <p:childTnLst>
+                                    <p:set>
+                                      <p:cBhvr>
+                                        <p:cTn id="6" dur="1" fill="hold">
+                                          <p:stCondLst>
+                                            <p:cond delay="0"/>
+                                          </p:stCondLst>
+                                        </p:cTn>
+                                        <p:tgtEl>
+                                          <p:spTgt spid="2">
+                                            <p:txEl>
+                                              <p:pRg st="0" end="0"/>
+                                            </p:txEl>
+                                          </p:spTgt>
+                                        </p:tgtEl>
+                                        <p:attrNameLst>
+                                          <p:attrName>style.visibility</p:attrName>
+                                        </p:attrNameLst>
+                                      </p:cBhvr>
+                                      <p:to>
+                                        <p:strVal val="visible"/>
+                                      </p:to>
+                                    </p:set>
+                                    <p:animEffect transition="in" filter="fade">
+                                      <p:cBhvr>
+                                        <p:cTn id="7" dur="1000"/>
+                                        <p:tgtEl>
+                                          <p:spTgt spid="2">
+                                            <p:txEl>
+                                              <p:pRg st="0" end="0"/>
+                                            </p:txEl>
+                                          </p:spTgt>
+                                        </p:tgtEl>
+                                      </p:cBhvr>
+                                    </p:animEffect>
+                                    <p:anim calcmode="lin" valueType="num">
+                                      <p:cBhvr>
+                                        <p:cTn id="8" dur="1000" fill="hold"/>
+                                        <p:tgtEl>
+                                          <p:spTgt spid="2">
+                                            <p:txEl>
+                                              <p:pRg st="0" end="0"/>
+                                            </p:txEl>
+                                          </p:spTgt>
+                                        </p:tgtEl>
+                                        <p:attrNameLst>
+                                          <p:attrName>ppt_x</p:attrName>
+                                        </p:attrNameLst>
+                                      </p:cBhvr>
+                                      <p:tavLst>
+                                        <p:tav tm="0">
+                                          <p:val>
+                                            <p:strVal val="#ppt_x"/>
+                                          </p:val>
+                                        </p:tav>
+                                        <p:tav tm="100000">
+                                          <p:val>
+                                            <p:strVal val="#ppt_x"/>
+                                          </p:val>
+                                        </p:tav>
+                                      </p:tavLst>
+                                    </p:anim>
+                                    <p:anim calcmode="lin" valueType="num">
+                                      <p:cBhvr>
+                                        <p:cTn id="9" dur="1000" fill="hold"/>
+                                        <p:tgtEl>
+                                          <p:spTgt spid="2">
+                                            <p:txEl>
+                                              <p:pRg st="0" end="0"/>
+                                            </p:txEl>
+                                          </p:spTgt>
+                                        </p:tgtEl>
+                                        <p:attrNameLst>
+                                          <p:attrName>ppt_y</p:attrName>
+                                        </p:attrNameLst>
+                                      </p:cBhvr>
+                                      <p:tavLst>
+                                        <p:tav tm="0">
+                                          <p:val>
+                                            <p:strVal val="#ppt_y+.1"/>
+                                          </p:val>
+                                        </p:tav>
+                                        <p:tav tm="100000">
+                                          <p:val>
+                                            <p:strVal val="#ppt_y"/>
+                                          </p:val>
+                                        </p:tav>
+                                      </p:tavLst>
+                                    </p:anim>
+                                  </p:childTnLst>
+                                </p:cTn>
+                              </p:par>
+                            </p:childTnLst>
+                          </p:cTn>
+                        </p:par>
+                      </p:childTnLst>
+                    </p:cTn>
+                  </p:par>
+                  <p:par>
+                    <p:cTn id="10" fill="hold">
+                      <p:stCondLst>
+                        <p:cond delay="indefinite"/>
+                      </p:stCondLst>
+                      <p:childTnLst>
+                        <p:par>
+                          <p:cTn id="11" fill="hold">
+                            <p:stCondLst>
+                              <p:cond delay="0"/>
+                            </p:stCondLst>
+                            <p:childTnLst>
+                              <p:par>
+                                <p:cTn id="12" presetID="2" presetClass="entr" presetSubtype="4" fill="hold" nodeType="clickEffect">
+                                  <p:stCondLst>
+                                    <p:cond delay="0"/>
+                                  </p:stCondLst>
+                                  <p:childTnLst>
+                                    <p:set>
+                                      <p:cBhvr>
+                                        <p:cTn id="13" dur="1" fill="hold">
+                                          <p:stCondLst>
+                                            <p:cond delay="0"/>
+                                          </p:stCondLst>
+                                        </p:cTn>
+                                        <p:tgtEl>
+                                          <p:spTgt spid="2">
+                                            <p:txEl>
+                                              <p:pRg st="1" end="1"/>
+                                            </p:txEl>
+                                          </p:spTgt>
+                                        </p:tgtEl>
+                                        <p:attrNameLst>
+                                          <p:attrName>style.visibility</p:attrName>
+                                        </p:attrNameLst>
+                                      </p:cBhvr>
+                                      <p:to>
+                                        <p:strVal val="visible"/>
+                                      </p:to>
+                                    </p:set>
+                                    <p:anim calcmode="lin" valueType="num">
+                                      <p:cBhvr additive="base">
+                                        <p:cTn id="14" dur="500" fill="hold"/>
+                                        <p:tgtEl>
+                                          <p:spTgt spid="2">
+                                            <p:txEl>
+                                              <p:pRg st="1" end="1"/>
+                                            </p:txEl>
+                                          </p:spTgt>
+                                        </p:tgtEl>
+                                        <p:attrNameLst>
+                                          <p:attrName>ppt_x</p:attrName>
+                                        </p:attrNameLst>
+                                      </p:cBhvr>
+                                      <p:tavLst>
+                                        <p:tav tm="0">
+                                          <p:val>
+                                            <p:strVal val="#ppt_x"/>
+                                          </p:val>
+                                        </p:tav>
+                                        <p:tav tm="100000">
+                                          <p:val>
+                                            <p:strVal val="#ppt_x"/>
+                                          </p:val>
+                                        </p:tav>
+                                      </p:tavLst>
+                                    </p:anim>
+                                    <p:anim calcmode="lin" valueType="num">
+                                      <p:cBhvr additive="base">
+                                        <p:cTn id="15" dur="500" fill="hold"/>
+                                        <p:tgtEl>
+                                          <p:spTgt spid="2">
+                                            <p:txEl>
+                                              <p:pRg st="1" end="1"/>
+                                            </p:txEl>
+                                          </p:spTgt>
+                                        </p:tgtEl>
+                                        <p:attrNameLst>
+                                          <p:attrName>ppt_y</p:attrName>
+                                        </p:attrNameLst>
+                                      </p:cBhvr>
+                                      <p:tavLst>
+                                        <p:tav tm="0">
+                                          <p:val>
+                                            <p:strVal val="1+#ppt_h/2"/>
+                                          </p:val>
+                                        </p:tav>
+                                        <p:tav tm="100000">
+                                          <p:val>
+                                            <p:strVal val="#ppt_y"/>
+                                          </p:val>
+                                        </p:tav>
+                                      </p:tavLst>
+                                    </p:anim>
+                                  </p:childTnLst>
+                                </p:cTn>
+                              </p:par>
+                              <p:par>
+                                <p:cTn id="16" presetID="2" presetClass="entr" presetSubtype="4" fill="hold" nodeType="withEffect">
+                                  <p:stCondLst>
+                                    <p:cond delay="0"/>
+                                  </p:stCondLst>
+                                  <p:childTnLst>
+                                    <p:set>
+                                      <p:cBhvr>
+                                        <p:cTn id="17" dur="1" fill="hold">
+                                          <p:stCondLst>
+                                            <p:cond delay="0"/>
+                                          </p:stCondLst>
+                                        </p:cTn>
+                                        <p:tgtEl>
+                                          <p:spTgt spid="2">
+                                            <p:txEl>
+                                              <p:pRg st="2" end="2"/>
+                                            </p:txEl>
+                                          </p:spTgt>
+                                        </p:tgtEl>
+                                        <p:attrNameLst>
+                                          <p:attrName>style.visibility</p:attrName>
+                                        </p:attrNameLst>
+                                      </p:cBhvr>
+                                      <p:to>
+                                        <p:strVal val="visible"/>
+                                      </p:to>
+                                    </p:set>
+                                    <p:anim calcmode="lin" valueType="num">
+                                      <p:cBhvr additive="base">
+                                        <p:cTn id="18" dur="500" fill="hold"/>
+                                        <p:tgtEl>
+                                          <p:spTgt spid="2">
+                                            <p:txEl>
+                                              <p:pRg st="2" end="2"/>
+                                            </p:txEl>
+                                          </p:spTgt>
+                                        </p:tgtEl>
+                                        <p:attrNameLst>
+                                          <p:attrName>ppt_x</p:attrName>
+                                        </p:attrNameLst>
+                                      </p:cBhvr>
+                                      <p:tavLst>
+                                        <p:tav tm="0">
+                                          <p:val>
+                                            <p:strVal val="#ppt_x"/>
+                                          </p:val>
+                                        </p:tav>
+                                        <p:tav tm="100000">
+                                          <p:val>
+                                            <p:strVal val="#ppt_x"/>
+                                          </p:val>
+                                        </p:tav>
+                                      </p:tavLst>
+                                    </p:anim>
+                                    <p:anim calcmode="lin" valueType="num">
+                                      <p:cBhvr additive="base">
+                                        <p:cTn id="19" dur="500" fill="hold"/>
+                                        <p:tgtEl>
+                                          <p:spTgt spid="2">
+                                            <p:txEl>
+                                              <p:pRg st="2" end="2"/>
+                                            </p:txEl>
+                                          </p:spTgt>
+                                        </p:tgtEl>
+                                        <p:attrNameLst>
+                                          <p:attrName>ppt_y</p:attrName>
+                                        </p:attrNameLst>
+                                      </p:cBhvr>
+                                      <p:tavLst>
+                                        <p:tav tm="0">
+                                          <p:val>
+                                            <p:strVal val="1+#ppt_h/2"/>
+                                          </p:val>
+                                        </p:tav>
+                                        <p:tav tm="100000">
+                                          <p:val>
+                                            <p:strVal val="#ppt_y"/>
+                                          </p:val>
+                                        </p:tav>
+                                      </p:tavLst>
+                                    </p:anim>
+                                  </p:childTnLst>
+                                </p:cTn>
+                              </p:par>
+                              <p:par>
+                                <p:cTn id="20" presetID="2" presetClass="entr" presetSubtype="4" fill="hold" nodeType="withEffect">
+                                  <p:stCondLst>
+                                    <p:cond delay="0"/>
+                                  </p:stCondLst>
+                                  <p:childTnLst>
+                                    <p:set>
+                                      <p:cBhvr>
+                                        <p:cTn id="21" dur="1" fill="hold">
+                                          <p:stCondLst>
+                                            <p:cond delay="0"/>
+                                          </p:stCondLst>
+                                        </p:cTn>
+                                        <p:tgtEl>
+                                          <p:spTgt spid="2">
+                                            <p:txEl>
+                                              <p:pRg st="3" end="3"/>
+                                            </p:txEl>
+                                          </p:spTgt>
+                                        </p:tgtEl>
+                                        <p:attrNameLst>
+                                          <p:attrName>style.visibility</p:attrName>
+                                        </p:attrNameLst>
+                                      </p:cBhvr>
+                                      <p:to>
+                                        <p:strVal val="visible"/>
+                                      </p:to>
+                                    </p:set>
+                                    <p:anim calcmode="lin" valueType="num">
+                                      <p:cBhvr additive="base">
+                                        <p:cTn id="22" dur="500" fill="hold"/>
+                                        <p:tgtEl>
+                                          <p:spTgt spid="2">
+                                            <p:txEl>
+                                              <p:pRg st="3" end="3"/>
+                                            </p:txEl>
+                                          </p:spTgt>
+                                        </p:tgtEl>
+                                        <p:attrNameLst>
+                                          <p:attrName>ppt_x</p:attrName>
+                                        </p:attrNameLst>
+                                      </p:cBhvr>
+                                      <p:tavLst>
+                                        <p:tav tm="0">
+                                          <p:val>
+                                            <p:strVal val="#ppt_x"/>
+                                          </p:val>
+                                        </p:tav>
+                                        <p:tav tm="100000">
+                                          <p:val>
+                                            <p:strVal val="#ppt_x"/>
+                                          </p:val>
+                                        </p:tav>
+                                      </p:tavLst>
+                                    </p:anim>
+                                    <p:anim calcmode="lin" valueType="num">
+                                      <p:cBhvr additive="base">
+                                        <p:cTn id="23" dur="500" fill="hold"/>
+                                        <p:tgtEl>
+                                          <p:spTgt spid="2">
+                                            <p:txEl>
+                                              <p:pRg st="3" end="3"/>
+                                            </p:txEl>
+                                          </p:spTgt>
+                                        </p:tgtEl>
+                                        <p:attrNameLst>
+                                          <p:attrName>ppt_y</p:attrName>
+                                        </p:attrNameLst>
+                                      </p:cBhvr>
+                                      <p:tavLst>
+                                        <p:tav tm="0">
+                                          <p:val>
+                                            <p:strVal val="1+#ppt_h/2"/>
+                                          </p:val>
+                                        </p:tav>
+                                        <p:tav tm="100000">
+                                          <p:val>
+                                            <p:strVal val="#ppt_y"/>
+                                          </p:val>
+                                        </p:tav>
+                                      </p:tavLst>
+                                    </p:anim>
+                                  </p:childTnLst>
+                                </p:cTn>
+                              </p:par>
+                              <p:par>
+                                <p:cTn id="24" presetID="2" presetClass="entr" presetSubtype="4" fill="hold" nodeType="withEffect">
+                                  <p:stCondLst>
+                                    <p:cond delay="0"/>
+                                  </p:stCondLst>
+                                  <p:childTnLst>
+                                    <p:set>
+                                      <p:cBhvr>
+                                        <p:cTn id="25" dur="1" fill="hold">
+                                          <p:stCondLst>
+                                            <p:cond delay="0"/>
+                                          </p:stCondLst>
+                                        </p:cTn>
+                                        <p:tgtEl>
+                                          <p:spTgt spid="2">
+                                            <p:txEl>
+                                              <p:pRg st="4" end="4"/>
+                                            </p:txEl>
+                                          </p:spTgt>
+                                        </p:tgtEl>
+                                        <p:attrNameLst>
+                                          <p:attrName>style.visibility</p:attrName>
+                                        </p:attrNameLst>
+                                      </p:cBhvr>
+                                      <p:to>
+                                        <p:strVal val="visible"/>
+                                      </p:to>
+                                    </p:set>
+                                    <p:anim calcmode="lin" valueType="num">
+                                      <p:cBhvr additive="base">
+                                        <p:cTn id="26" dur="500" fill="hold"/>
+                                        <p:tgtEl>
+                                          <p:spTgt spid="2">
+                                            <p:txEl>
+                                              <p:pRg st="4" end="4"/>
+                                            </p:txEl>
+                                          </p:spTgt>
+                                        </p:tgtEl>
+                                        <p:attrNameLst>
+                                          <p:attrName>ppt_x</p:attrName>
+                                        </p:attrNameLst>
+                                      </p:cBhvr>
+                                      <p:tavLst>
+                                        <p:tav tm="0">
+                                          <p:val>
+                                            <p:strVal val="#ppt_x"/>
+                                          </p:val>
+                                        </p:tav>
+                                        <p:tav tm="100000">
+                                          <p:val>
+                                            <p:strVal val="#ppt_x"/>
+                                          </p:val>
+                                        </p:tav>
+                                      </p:tavLst>
+                                    </p:anim>
+                                    <p:anim calcmode="lin" valueType="num">
+                                      <p:cBhvr additive="base">
+                                        <p:cTn id="27" dur="500" fill="hold"/>
+                                        <p:tgtEl>
+                                          <p:spTgt spid="2">
+                                            <p:txEl>
+                                              <p:pRg st="4" end="4"/>
+                                            </p:txEl>
+                                          </p:spTgt>
+                                        </p:tgtEl>
+                                        <p:attrNameLst>
+                                          <p:attrName>ppt_y</p:attrName>
+                                        </p:attrNameLst>
+                                      </p:cBhvr>
+                                      <p:tavLst>
+                                        <p:tav tm="0">
+                                          <p:val>
+                                            <p:strVal val="1+#ppt_h/2"/>
+                                          </p:val>
+                                        </p:tav>
+                                        <p:tav tm="100000">
+                                          <p:val>
+                                            <p:strVal val="#ppt_y"/>
+                                          </p:val>
+                                        </p:tav>
+                                      </p:tavLst>
+                                    </p:anim>
+                                  </p:childTnLst>
+                                </p:cTn>
+                              </p:par>
+                            </p:childTnLst>
+                          </p:cTn>
+                        </p:par>
+                      </p:childTnLst>
+                    </p:cTn>
+                  </p:par>
+                </p:childTnLst>
+              </p:cTn>
+              <p:prevCondLst>
+                <p:cond evt="onPrev" delay="0">
+                  <p:tgtEl>
+                    <p:sldTgt/>
+                  </p:tgtEl>
+                </p:cond>
+              </p:prevCondLst>
+              <p:nextCondLst>
+                <p:cond evt="onNext" delay="0">
+                  <p:tgtEl>
+                    <p:sldTgt/>
+                  </p:tgtEl>
+                </p:cond>
+              </p:nextCondLst>
+            </p:seq>
+          </p:childTnLst>
+        </p:cTn>
       </p:par>
     </p:tnLst>
   </p:timing>
@@ -12228,20 +13145,52 @@
               <a:t>: </a:t>
             </a:r>
             <a:r>
+              <a:rPr lang="en-US" altLang="zh-CN" sz="2600" b="1" dirty="0">
+                <a:solidFill>
+                  <a:srgbClr val="008000"/>
+                </a:solidFill>
+              </a:rPr>
+              <a:t>&lt;input </a:t>
+            </a:r>
+            <a:r>
               <a:rPr lang="en-US" altLang="zh-CN" sz="2600" dirty="0">
                 <a:solidFill>
+                  <a:srgbClr val="FF0000"/>
+                </a:solidFill>
+              </a:rPr>
+              <a:t>type="search" </a:t>
+            </a:r>
+            <a:r>
+              <a:rPr lang="en-US" altLang="zh-CN" sz="2600" dirty="0">
+                <a:solidFill>
                   <a:srgbClr val="000000"/>
                 </a:solidFill>
               </a:rPr>
-              <a:t>&lt;input </a:t>
+              <a:t>name="</a:t>
+            </a:r>
+            <a:r>
+              <a:rPr lang="en-US" altLang="zh-CN" sz="2600" dirty="0" err="1">
+                <a:solidFill>
+                  <a:srgbClr val="000000"/>
+                </a:solidFill>
+              </a:rPr>
+              <a:t>gongfu</a:t>
             </a:r>
             <a:r>
               <a:rPr lang="en-US" altLang="zh-CN" sz="2600" dirty="0">
                 <a:solidFill>
-                  <a:srgbClr val="FF0000"/>
-                </a:solidFill>
-              </a:rPr>
-              <a:t>type="search" </a:t>
+                  <a:srgbClr val="000000"/>
+                </a:solidFill>
+              </a:rPr>
+              <a:t>" </a:t>
+            </a:r>
+            <a:r>
+              <a:rPr lang="en-US" altLang="zh-CN" sz="2600" dirty="0" smtClean="0">
+                <a:solidFill>
+                  <a:srgbClr val="000000"/>
+                </a:solidFill>
+              </a:rPr>
+              <a:t> autocomplete="on" list</a:t>
             </a:r>
             <a:r>
               <a:rPr lang="en-US" altLang="zh-CN" sz="2600" dirty="0">
@@ -12249,88 +13198,37 @@
                   <a:srgbClr val="000000"/>
                 </a:solidFill>
               </a:rPr>
-              <a:t>name="</a:t>
-            </a:r>
-            <a:r>
-              <a:rPr lang="en-US" altLang="zh-CN" sz="2600" dirty="0" err="1">
+              <a:t>="</a:t>
+            </a:r>
+            <a:r>
+              <a:rPr lang="en-US" altLang="zh-CN" sz="2600" dirty="0">
+                <a:solidFill>
+                  <a:srgbClr val="0000FF"/>
+                </a:solidFill>
+              </a:rPr>
+              <a:t>names</a:t>
+            </a:r>
+            <a:r>
+              <a:rPr lang="en-US" altLang="zh-CN" sz="2600" dirty="0">
                 <a:solidFill>
                   <a:srgbClr val="000000"/>
                 </a:solidFill>
               </a:rPr>
-              <a:t>gongfu</a:t>
-            </a:r>
-            <a:r>
-              <a:rPr lang="en-US" altLang="zh-CN" sz="2600" dirty="0">
-                <a:solidFill>
-                  <a:srgbClr val="000000"/>
-                </a:solidFill>
-              </a:rPr>
               <a:t>" </a:t>
             </a:r>
             <a:r>
-              <a:rPr lang="en-US" altLang="zh-CN" sz="2600" dirty="0" smtClean="0">
-                <a:solidFill>
-                  <a:srgbClr val="000000"/>
-                </a:solidFill>
-              </a:rPr>
-              <a:t> autocomplete</a:t>
-            </a:r>
-            <a:r>
-              <a:rPr lang="en-US" altLang="zh-CN" sz="2600" dirty="0">
-                <a:solidFill>
-                  <a:srgbClr val="000000"/>
-                </a:solidFill>
-              </a:rPr>
-              <a:t>="on" </a:t>
-            </a:r>
-            <a:r>
-              <a:rPr lang="en-US" altLang="zh-CN" sz="2600" dirty="0" smtClean="0">
-                <a:solidFill>
-                  <a:srgbClr val="000000"/>
-                </a:solidFill>
-              </a:rPr>
-              <a:t>list</a:t>
-            </a:r>
-            <a:r>
-              <a:rPr lang="en-US" altLang="zh-CN" sz="2600" dirty="0">
-                <a:solidFill>
-                  <a:srgbClr val="000000"/>
-                </a:solidFill>
-              </a:rPr>
-              <a:t>="</a:t>
-            </a:r>
-            <a:r>
-              <a:rPr lang="en-US" altLang="zh-CN" sz="2600" dirty="0">
-                <a:solidFill>
-                  <a:srgbClr val="0000FF"/>
-                </a:solidFill>
-              </a:rPr>
-              <a:t>names</a:t>
-            </a:r>
-            <a:r>
-              <a:rPr lang="en-US" altLang="zh-CN" sz="2600" dirty="0">
-                <a:solidFill>
-                  <a:srgbClr val="000000"/>
-                </a:solidFill>
-              </a:rPr>
-              <a:t>" </a:t>
-            </a:r>
-            <a:r>
-              <a:rPr lang="en-US" altLang="zh-CN" sz="2600" dirty="0">
-                <a:solidFill>
-                  <a:srgbClr val="FF0000"/>
-                </a:solidFill>
-              </a:rPr>
-              <a:t>results</a:t>
-            </a:r>
-            <a:r>
-              <a:rPr lang="en-US" altLang="zh-CN" sz="2600" dirty="0">
-                <a:solidFill>
-                  <a:srgbClr val="000000"/>
-                </a:solidFill>
-              </a:rPr>
-              <a:t> /&gt;</a:t>
-            </a:r>
+              <a:rPr lang="en-US" altLang="zh-CN" sz="2600" b="1" dirty="0" smtClean="0">
+                <a:solidFill>
+                  <a:srgbClr val="008000"/>
+                </a:solidFill>
+              </a:rPr>
+              <a:t>/&gt;</a:t>
+            </a:r>
+            <a:endParaRPr lang="en-US" altLang="zh-CN" sz="2600" b="1" dirty="0">
+              <a:solidFill>
+                <a:srgbClr val="008000"/>
+              </a:solidFill>
+            </a:endParaRPr>
           </a:p>
           <a:p>
             <a:pPr>
@@ -12339,44 +13237,60 @@
               </a:lnSpc>
             </a:pPr>
             <a:r>
+              <a:rPr lang="en-US" altLang="zh-CN" sz="2600" b="1" dirty="0">
+                <a:solidFill>
+                  <a:srgbClr val="008000"/>
+                </a:solidFill>
+              </a:rPr>
+              <a:t>&lt;</a:t>
+            </a:r>
+            <a:r>
+              <a:rPr lang="en-US" altLang="zh-CN" sz="2600" b="1" dirty="0" err="1">
+                <a:solidFill>
+                  <a:srgbClr val="008000"/>
+                </a:solidFill>
+              </a:rPr>
+              <a:t>datalist</a:t>
+            </a:r>
+            <a:r>
+              <a:rPr lang="en-US" altLang="zh-CN" sz="2600" b="1" dirty="0">
+                <a:solidFill>
+                  <a:srgbClr val="008000"/>
+                </a:solidFill>
+              </a:rPr>
+              <a:t> </a:t>
+            </a:r>
+            <a:r>
               <a:rPr lang="en-US" altLang="zh-CN" sz="2600" dirty="0">
                 <a:solidFill>
                   <a:srgbClr val="000000"/>
                 </a:solidFill>
               </a:rPr>
-              <a:t>&lt;</a:t>
-            </a:r>
-            <a:r>
-              <a:rPr lang="en-US" altLang="zh-CN" sz="2600" dirty="0" err="1">
+              <a:t>id="</a:t>
+            </a:r>
+            <a:r>
+              <a:rPr lang="en-US" altLang="zh-CN" sz="2600" dirty="0">
+                <a:solidFill>
+                  <a:srgbClr val="0000FF"/>
+                </a:solidFill>
+              </a:rPr>
+              <a:t>names</a:t>
+            </a:r>
+            <a:r>
+              <a:rPr lang="en-US" altLang="zh-CN" sz="2600" dirty="0">
                 <a:solidFill>
                   <a:srgbClr val="000000"/>
                 </a:solidFill>
               </a:rPr>
-              <a:t>datalist</a:t>
-            </a:r>
-            <a:r>
-              <a:rPr lang="en-US" altLang="zh-CN" sz="2600" dirty="0">
-                <a:solidFill>
-                  <a:srgbClr val="000000"/>
-                </a:solidFill>
-              </a:rPr>
-              <a:t> id="</a:t>
-            </a:r>
-            <a:r>
-              <a:rPr lang="en-US" altLang="zh-CN" sz="2600" dirty="0">
-                <a:solidFill>
-                  <a:srgbClr val="0000FF"/>
-                </a:solidFill>
-              </a:rPr>
-              <a:t>names</a:t>
-            </a:r>
-            <a:r>
-              <a:rPr lang="en-US" altLang="zh-CN" sz="2600" dirty="0">
-                <a:solidFill>
-                  <a:srgbClr val="000000"/>
-                </a:solidFill>
-              </a:rPr>
-              <a:t>"&gt;</a:t>
+              <a:t>"</a:t>
+            </a:r>
+            <a:r>
+              <a:rPr lang="en-US" altLang="zh-CN" sz="2600" b="1" dirty="0">
+                <a:solidFill>
+                  <a:srgbClr val="008000"/>
+                </a:solidFill>
+              </a:rPr>
+              <a:t>&gt;</a:t>
             </a:r>
           </a:p>
           <a:p>
@@ -12510,25 +13424,25 @@
               </a:lnSpc>
             </a:pPr>
             <a:r>
-              <a:rPr lang="en-US" altLang="zh-CN" sz="2600" dirty="0" smtClean="0">
-                <a:solidFill>
-                  <a:srgbClr val="000000"/>
+              <a:rPr lang="en-US" altLang="zh-CN" sz="2600" b="1" dirty="0" smtClean="0">
+                <a:solidFill>
+                  <a:srgbClr val="008000"/>
                 </a:solidFill>
               </a:rPr>
               <a:t>&lt;/</a:t>
             </a:r>
             <a:r>
-              <a:rPr lang="en-US" altLang="zh-CN" sz="2600" dirty="0" err="1">
-                <a:solidFill>
-                  <a:srgbClr val="000000"/>
+              <a:rPr lang="en-US" altLang="zh-CN" sz="2600" b="1" dirty="0" err="1">
+                <a:solidFill>
+                  <a:srgbClr val="008000"/>
                 </a:solidFill>
               </a:rPr>
               <a:t>datalist</a:t>
             </a:r>
             <a:r>
-              <a:rPr lang="en-US" altLang="zh-CN" sz="2600" dirty="0">
-                <a:solidFill>
-                  <a:srgbClr val="000000"/>
+              <a:rPr lang="en-US" altLang="zh-CN" sz="2600" b="1" dirty="0">
+                <a:solidFill>
+                  <a:srgbClr val="008000"/>
                 </a:solidFill>
               </a:rPr>
               <a:t>&gt;</a:t>
@@ -13201,7 +14115,55 @@
                   <a:srgbClr val="000000"/>
                 </a:solidFill>
               </a:rPr>
-              <a:t>output name="x" for="a b"&gt;&lt;/output&gt;</a:t>
+              <a:t>output </a:t>
+            </a:r>
+            <a:r>
+              <a:rPr lang="en-US" altLang="zh-CN" sz="2800" dirty="0" smtClean="0">
+                <a:solidFill>
+                  <a:srgbClr val="000000"/>
+                </a:solidFill>
+              </a:rPr>
+              <a:t> name</a:t>
+            </a:r>
+            <a:r>
+              <a:rPr lang="en-US" altLang="zh-CN" sz="2800" dirty="0">
+                <a:solidFill>
+                  <a:srgbClr val="000000"/>
+                </a:solidFill>
+              </a:rPr>
+              <a:t>="x" </a:t>
+            </a:r>
+            <a:r>
+              <a:rPr lang="en-US" altLang="zh-CN" sz="2800" dirty="0" smtClean="0">
+                <a:solidFill>
+                  <a:srgbClr val="000000"/>
+                </a:solidFill>
+              </a:rPr>
+              <a:t> </a:t>
+            </a:r>
+            <a:r>
+              <a:rPr lang="en-US" altLang="zh-CN" sz="2800" dirty="0" smtClean="0">
+                <a:solidFill>
+                  <a:srgbClr val="FF0000"/>
+                </a:solidFill>
+              </a:rPr>
+              <a:t>for</a:t>
+            </a:r>
+            <a:r>
+              <a:rPr lang="en-US" altLang="zh-CN" sz="2800" dirty="0">
+                <a:solidFill>
+                  <a:srgbClr val="FF0000"/>
+                </a:solidFill>
+              </a:rPr>
+              <a:t>="a b"</a:t>
+            </a:r>
+            <a:r>
+              <a:rPr lang="en-US" altLang="zh-CN" sz="2800" dirty="0">
+                <a:solidFill>
+                  <a:srgbClr val="000000"/>
+                </a:solidFill>
+              </a:rPr>
+              <a:t>&gt;&lt;/output&gt;</a:t>
             </a:r>
             <a:endParaRPr lang="zh-CN" altLang="zh-CN" sz="2400" dirty="0">
               <a:solidFill>
@@ -13258,14 +14220,14 @@
           <p:nvPr>
             <p:extLst>
               <p:ext uri="{D42A27DB-BD31-4B8C-83A1-F6EECF244321}">
-                <p14:modId xmlns:p14="http://schemas.microsoft.com/office/powerpoint/2010/main" val="2782688298"/>
+                <p14:modId xmlns:p14="http://schemas.microsoft.com/office/powerpoint/2010/main" val="4049588879"/>
               </p:ext>
             </p:extLst>
           </p:nvPr>
         </p:nvGraphicFramePr>
         <p:xfrm>
           <a:off x="1378305" y="2192598"/>
-          <a:ext cx="8912876" cy="2998470"/>
+          <a:ext cx="8912876" cy="2632710"/>
         </p:xfrm>
         <a:graphic>
           <a:graphicData uri="http://schemas.openxmlformats.org/drawingml/2006/table">
@@ -13277,21 +14239,21 @@
                 <a:gridCol w="1349411">
                   <a:extLst>
                     <a:ext uri="{9D8B030D-6E8A-4147-A177-3AD203B41FA5}">
-                      <a16:colId xmlns:a16="http://schemas.microsoft.com/office/drawing/2014/main" val="2366435004"/>
+                      <a16:colId xmlns:a16="http://schemas.microsoft.com/office/drawing/2014/main" xmlns="" val="2366435004"/>
                     </a:ext>
                   </a:extLst>
                 </a:gridCol>
                 <a:gridCol w="3601650">
                   <a:extLst>
                     <a:ext uri="{9D8B030D-6E8A-4147-A177-3AD203B41FA5}">
-                      <a16:colId xmlns:a16="http://schemas.microsoft.com/office/drawing/2014/main" val="2578507323"/>
+                      <a16:colId xmlns:a16="http://schemas.microsoft.com/office/drawing/2014/main" xmlns="" val="2578507323"/>
                     </a:ext>
                   </a:extLst>
                 </a:gridCol>
                 <a:gridCol w="3961815">
                   <a:extLst>
                     <a:ext uri="{9D8B030D-6E8A-4147-A177-3AD203B41FA5}">
-                      <a16:colId xmlns:a16="http://schemas.microsoft.com/office/drawing/2014/main" val="1670408841"/>
+                      <a16:colId xmlns:a16="http://schemas.microsoft.com/office/drawing/2014/main" xmlns="" val="1670408841"/>
                     </a:ext>
                   </a:extLst>
                 </a:gridCol>
@@ -13353,7 +14315,7 @@
                 </a:tc>
                 <a:extLst>
                   <a:ext uri="{0D108BD9-81ED-4DB2-BD59-A6C34878D82A}">
-                    <a16:rowId xmlns:a16="http://schemas.microsoft.com/office/drawing/2014/main" val="3205825364"/>
+                    <a16:rowId xmlns:a16="http://schemas.microsoft.com/office/drawing/2014/main" xmlns="" val="3205825364"/>
                   </a:ext>
                 </a:extLst>
               </a:tr>
@@ -13423,7 +14385,7 @@
                 </a:tc>
                 <a:extLst>
                   <a:ext uri="{0D108BD9-81ED-4DB2-BD59-A6C34878D82A}">
-                    <a16:rowId xmlns:a16="http://schemas.microsoft.com/office/drawing/2014/main" val="442501121"/>
+                    <a16:rowId xmlns:a16="http://schemas.microsoft.com/office/drawing/2014/main" xmlns="" val="442501121"/>
                   </a:ext>
                 </a:extLst>
               </a:tr>
@@ -13501,7 +14463,7 @@
                 </a:tc>
                 <a:extLst>
                   <a:ext uri="{0D108BD9-81ED-4DB2-BD59-A6C34878D82A}">
-                    <a16:rowId xmlns:a16="http://schemas.microsoft.com/office/drawing/2014/main" val="3931292619"/>
+                    <a16:rowId xmlns:a16="http://schemas.microsoft.com/office/drawing/2014/main" xmlns="" val="3931292619"/>
                   </a:ext>
                 </a:extLst>
               </a:tr>
@@ -13563,15 +14525,34 @@
                           <a:latin typeface="微软雅黑" panose="020B0503020204020204" pitchFamily="34" charset="-122"/>
                           <a:ea typeface="微软雅黑" panose="020B0503020204020204" pitchFamily="34" charset="-122"/>
                         </a:rPr>
-                        <a:t>定义对象的唯一名称。（表单提交时使用）</a:t>
+                        <a:t>定义对象的唯一名称</a:t>
                       </a:r>
+                      <a:r>
+                        <a:rPr lang="zh-CN" altLang="en-US" sz="2400" dirty="0" smtClean="0">
+                          <a:solidFill>
+                            <a:srgbClr val="000000"/>
+                          </a:solidFill>
+                          <a:effectLst/>
+                          <a:latin typeface="微软雅黑" panose="020B0503020204020204" pitchFamily="34" charset="-122"/>
+                          <a:ea typeface="微软雅黑" panose="020B0503020204020204" pitchFamily="34" charset="-122"/>
+                        </a:rPr>
+                        <a:t>。</a:t>
+                      </a:r>
+                      <a:endParaRPr lang="zh-CN" altLang="en-US" sz="2400" dirty="0">
+                        <a:solidFill>
+                          <a:srgbClr val="000000"/>
+                        </a:solidFill>
+                        <a:effectLst/>
+                        <a:latin typeface="微软雅黑" panose="020B0503020204020204" pitchFamily="34" charset="-122"/>
+                        <a:ea typeface="微软雅黑" panose="020B0503020204020204" pitchFamily="34" charset="-122"/>
+                      </a:endParaRPr>
                     </a:p>
                   </a:txBody>
                   <a:tcPr marL="57150" marR="142875" marT="57150" marB="57150" anchor="ctr"/>
                 </a:tc>
                 <a:extLst>
                   <a:ext uri="{0D108BD9-81ED-4DB2-BD59-A6C34878D82A}">
-                    <a16:rowId xmlns:a16="http://schemas.microsoft.com/office/drawing/2014/main" val="3486632590"/>
+                    <a16:rowId xmlns:a16="http://schemas.microsoft.com/office/drawing/2014/main" xmlns="" val="3486632590"/>
                   </a:ext>
                 </a:extLst>
               </a:tr>
@@ -14228,7 +15209,11 @@
             <a:endParaRPr lang="en-US" altLang="zh-CN" dirty="0" smtClean="0"/>
           </a:p>
           <a:p>
-            <a:pPr lvl="1"/>
+            <a:pPr lvl="1">
+              <a:spcBef>
+                <a:spcPts val="1200"/>
+              </a:spcBef>
+            </a:pPr>
             <a:r>
               <a:rPr lang="zh-CN" altLang="en-US" dirty="0" smtClean="0">
                 <a:solidFill>
@@ -14262,28 +15247,20 @@
               <a:t>form</a:t>
             </a:r>
             <a:r>
+              <a:rPr lang="zh-CN" altLang="en-US" dirty="0" smtClean="0">
+                <a:solidFill>
+                  <a:srgbClr val="C00000"/>
+                </a:solidFill>
+              </a:rPr>
+              <a:t>属性。</a:t>
+            </a:r>
+            <a:r>
               <a:rPr lang="zh-CN" altLang="en-US" dirty="0">
                 <a:solidFill>
                   <a:srgbClr val="C00000"/>
                 </a:solidFill>
               </a:rPr>
-              <a:t>属性，属性值为该表单的</a:t>
-            </a:r>
-            <a:r>
-              <a:rPr lang="en-US" altLang="zh-CN" dirty="0">
-                <a:solidFill>
-                  <a:srgbClr val="C00000"/>
-                </a:solidFill>
-              </a:rPr>
-              <a:t>id</a:t>
-            </a:r>
-            <a:r>
-              <a:rPr lang="zh-CN" altLang="en-US" dirty="0">
-                <a:solidFill>
-                  <a:srgbClr val="C00000"/>
-                </a:solidFill>
-              </a:rPr>
-              <a:t>。如需</a:t>
+              <a:t>如需</a:t>
             </a:r>
             <a:r>
               <a:rPr lang="zh-CN" altLang="en-US" dirty="0" smtClean="0">
@@ -14853,15 +15830,33 @@
                                   </p:childTnLst>
                                 </p:cTn>
                               </p:par>
+                            </p:childTnLst>
+                          </p:cTn>
+                        </p:par>
+                      </p:childTnLst>
+                    </p:cTn>
+                  </p:par>
+                  <p:par>
+                    <p:cTn id="10" fill="hold">
+                      <p:stCondLst>
+                        <p:cond delay="indefinite"/>
+                      </p:stCondLst>
+                      <p:childTnLst>
+                        <p:par>
+                          <p:cTn id="11" fill="hold">
+                            <p:stCondLst>
+                              <p:cond delay="0"/>
+                            </p:stCondLst>
+                            <p:childTnLst>
                               <p:par>
-                                <p:cTn id="10" presetID="42" presetClass="entr" presetSubtype="0" fill="hold" nodeType="withEffect">
+                                <p:cTn id="12" presetID="42" presetClass="entr" presetSubtype="0" fill="hold" nodeType="clickEffect">
                                   <p:stCondLst>
                                     <p:cond delay="0"/>
                                   </p:stCondLst>
                                   <p:childTnLst>
                                     <p:set>
                                       <p:cBhvr>
-                                        <p:cTn id="11" dur="1" fill="hold">
+                                        <p:cTn id="13" dur="1" fill="hold">
                                           <p:stCondLst>
                                             <p:cond delay="0"/>
                                           </p:stCondLst>
@@ -14883,7 +15878,7 @@
                                     </p:set>
                                     <p:animEffect transition="in" filter="fade">
                                       <p:cBhvr>
-                                        <p:cTn id="12" dur="1000"/>
+                                        <p:cTn id="14" dur="1000"/>
                                         <p:tgtEl>
                                           <p:spTgt spid="2">
                                             <p:txEl>
@@ -14895,7 +15890,7 @@
                                     </p:animEffect>
                                     <p:anim calcmode="lin" valueType="num">
                                       <p:cBhvr>
-                                        <p:cTn id="13" dur="1000" fill="hold"/>
+                                        <p:cTn id="15" dur="1000" fill="hold"/>
                                         <p:tgtEl>
                                           <p:spTgt spid="2">
                                             <p:txEl>
@@ -14922,7 +15917,7 @@
                                     </p:anim>
                                     <p:anim calcmode="lin" valueType="num">
                                       <p:cBhvr>
-                                        <p:cTn id="14" dur="1000" fill="hold"/>
+                                        <p:cTn id="16" dur="1000" fill="hold"/>
                                         <p:tgtEl>
                                           <p:spTgt spid="2">
                                             <p:txEl>
@@ -15500,6 +16495,11 @@
             </a:endParaRPr>
           </a:p>
           <a:p>
+            <a:pPr>
+              <a:spcBef>
+                <a:spcPts val="1800"/>
+              </a:spcBef>
+            </a:pPr>
             <a:r>
               <a:rPr lang="en-US" altLang="zh-CN" dirty="0">
                 <a:solidFill>
@@ -15657,7 +16657,7 @@
         </p:blipFill>
         <p:spPr>
           <a:xfrm>
-            <a:off x="7486662" y="3114040"/>
+            <a:off x="7486503" y="3648392"/>
             <a:ext cx="3219450" cy="2600325"/>
           </a:xfrm>
           <a:prstGeom prst="rect">
@@ -16219,7 +17219,11 @@
             <a:endParaRPr lang="zh-CN" altLang="en-US" dirty="0"/>
           </a:p>
           <a:p>
-            <a:pPr lvl="1"/>
+            <a:pPr lvl="1">
+              <a:spcAft>
+                <a:spcPts val="2400"/>
+              </a:spcAft>
+            </a:pPr>
             <a:r>
               <a:rPr lang="zh-CN" altLang="en-US" dirty="0"/>
               <a:t>提供</a:t>
@@ -17450,7 +18454,7 @@
             </a:r>
             <a:r>
               <a:rPr lang="zh-CN" altLang="en-US" dirty="0" smtClean="0"/>
-              <a:t>聚焦。</a:t>
+              <a:t>聚焦</a:t>
             </a:r>
             <a:endParaRPr lang="en-US" altLang="zh-CN" dirty="0" smtClean="0"/>
           </a:p>
@@ -17705,7 +18709,7 @@
           <p:nvPr/>
         </p:nvPicPr>
         <p:blipFill>
-          <a:blip r:embed="rId2"/>
+          <a:blip r:embed="rId3"/>
           <a:stretch>
             <a:fillRect/>
           </a:stretch>
@@ -17739,7 +18743,7 @@
           <p:nvPr/>
         </p:nvPicPr>
         <p:blipFill>
-          <a:blip r:embed="rId3"/>
+          <a:blip r:embed="rId4"/>
           <a:stretch>
             <a:fillRect/>
           </a:stretch>
@@ -22749,12 +23753,12 @@
   <p:tag name="KSO_WM_BEAUTIFY_FLAG" val="#wm#"/>
   <p:tag name="KSO_WM_TEMPLATE_CATEGORY" val="custom"/>
   <p:tag name="KSO_WM_TEMPLATE_INDEX" val="160336"/>
-  <p:tag name="KSO_WM_UNIT_TYPE" val="a"/>
+  <p:tag name="KSO_WM_UNIT_TYPE" val="b"/>
   <p:tag name="KSO_WM_UNIT_INDEX" val="1"/>
-  <p:tag name="KSO_WM_UNIT_ID" val="custom160336_1*a*1"/>
+  <p:tag name="KSO_WM_UNIT_ID" val="custom160336_1*b*1"/>
   <p:tag name="KSO_WM_UNIT_CLEAR" val="1"/>
   <p:tag name="KSO_WM_UNIT_LAYERLEVEL" val="1"/>
-  <p:tag name="KSO_WM_UNIT_VALUE" val="32"/>
+  <p:tag name="KSO_WM_UNIT_VALUE" val="25"/>
   <p:tag name="KSO_WM_UNIT_ISCONTENTSTITLE" val="0"/>
   <p:tag name="KSO_WM_UNIT_HIGHLIGHT" val="0"/>
   <p:tag name="KSO_WM_UNIT_COMPATIBLE" val="0"/>
@@ -22941,12 +23945,12 @@
   <p:tag name="KSO_WM_BEAUTIFY_FLAG" val="#wm#"/>
   <p:tag name="KSO_WM_TEMPLATE_CATEGORY" val="custom"/>
   <p:tag name="KSO_WM_TEMPLATE_INDEX" val="160336"/>
-  <p:tag name="KSO_WM_UNIT_TYPE" val="b"/>
+  <p:tag name="KSO_WM_UNIT_TYPE" val="a"/>
   <p:tag name="KSO_WM_UNIT_INDEX" val="1"/>
-  <p:tag name="KSO_WM_UNIT_ID" val="custom160336_1*b*1"/>
+  <p:tag name="KSO_WM_UNIT_ID" val="custom160336_1*a*1"/>
   <p:tag name="KSO_WM_UNIT_CLEAR" val="1"/>
   <p:tag name="KSO_WM_UNIT_LAYERLEVEL" val="1"/>
-  <p:tag name="KSO_WM_UNIT_VALUE" val="25"/>
+  <p:tag name="KSO_WM_UNIT_VALUE" val="32"/>
   <p:tag name="KSO_WM_UNIT_ISCONTENTSTITLE" val="0"/>
   <p:tag name="KSO_WM_UNIT_HIGHLIGHT" val="0"/>
   <p:tag name="KSO_WM_UNIT_COMPATIBLE" val="0"/>
@@ -23739,7 +24743,7 @@
   </a:extraClrSchemeLst>
   <a:extLst>
     <a:ext uri="{05A4C25C-085E-4340-85A3-A5531E510DB2}">
-      <thm15:themeFamily xmlns:thm15="http://schemas.microsoft.com/office/thememl/2012/main" name="Office Theme" id="{62F939B6-93AF-4DB8-9C6B-D6C7DFDC589F}" vid="{4A3C46E8-61CC-4603-A589-7422A47A8E4A}"/>
+      <thm15:themeFamily xmlns:thm15="http://schemas.microsoft.com/office/thememl/2012/main" xmlns="" name="Office Theme" id="{62F939B6-93AF-4DB8-9C6B-D6C7DFDC589F}" vid="{4A3C46E8-61CC-4603-A589-7422A47A8E4A}"/>
     </a:ext>
   </a:extLst>
 </a:theme>
@@ -24027,7 +25031,7 @@
   <a:extraClrSchemeLst/>
   <a:extLst>
     <a:ext uri="{05A4C25C-085E-4340-85A3-A5531E510DB2}">
-      <thm15:themeFamily xmlns:thm15="http://schemas.microsoft.com/office/thememl/2012/main" name="Office Theme" id="{62F939B6-93AF-4DB8-9C6B-D6C7DFDC589F}" vid="{4A3C46E8-61CC-4603-A589-7422A47A8E4A}"/>
+      <thm15:themeFamily xmlns:thm15="http://schemas.microsoft.com/office/thememl/2012/main" xmlns="" name="Office Theme" id="{62F939B6-93AF-4DB8-9C6B-D6C7DFDC589F}" vid="{4A3C46E8-61CC-4603-A589-7422A47A8E4A}"/>
     </a:ext>
   </a:extLst>
 </a:theme>

</xml_diff>